<commit_message>
add short version framework
</commit_message>
<xml_diff>
--- a/static/Course_Modularization/Intro, general, packages/matrixAlgebraSlidesExtra.pptx
+++ b/static/Course_Modularization/Intro, general, packages/matrixAlgebraSlidesExtra.pptx
@@ -207,7 +207,7 @@
           <a:p>
             <a:fld id="{80022054-F6B9-B04E-9F80-BE6C2BED9348}" type="datetimeFigureOut">
               <a:rPr lang="en-US" smtClean="0"/>
-              <a:t>2021-04-15</a:t>
+              <a:t>12/1/21</a:t>
             </a:fld>
             <a:endParaRPr lang="en-US"/>
           </a:p>
@@ -1305,7 +1305,7 @@
           <a:p>
             <a:fld id="{DD3575FE-2CC2-2845-A91B-203C440E7198}" type="datetimeFigureOut">
               <a:rPr lang="en-US" smtClean="0"/>
-              <a:t>2021-04-15</a:t>
+              <a:t>12/1/21</a:t>
             </a:fld>
             <a:endParaRPr lang="en-US"/>
           </a:p>
@@ -1636,7 +1636,7 @@
           <a:p>
             <a:fld id="{DD3575FE-2CC2-2845-A91B-203C440E7198}" type="datetimeFigureOut">
               <a:rPr lang="en-US" smtClean="0"/>
-              <a:t>2021-04-15</a:t>
+              <a:t>12/1/21</a:t>
             </a:fld>
             <a:endParaRPr lang="en-US"/>
           </a:p>
@@ -1820,7 +1820,7 @@
           <a:p>
             <a:fld id="{DD3575FE-2CC2-2845-A91B-203C440E7198}" type="datetimeFigureOut">
               <a:rPr lang="en-US" smtClean="0"/>
-              <a:t>2021-04-15</a:t>
+              <a:t>12/1/21</a:t>
             </a:fld>
             <a:endParaRPr lang="en-US"/>
           </a:p>
@@ -2009,7 +2009,7 @@
           <a:p>
             <a:fld id="{DD3575FE-2CC2-2845-A91B-203C440E7198}" type="datetimeFigureOut">
               <a:rPr lang="en-US" smtClean="0"/>
-              <a:t>2021-04-15</a:t>
+              <a:t>12/1/21</a:t>
             </a:fld>
             <a:endParaRPr lang="en-US"/>
           </a:p>
@@ -2161,7 +2161,7 @@
           <a:p>
             <a:fld id="{DD3575FE-2CC2-2845-A91B-203C440E7198}" type="datetimeFigureOut">
               <a:rPr lang="en-US" smtClean="0"/>
-              <a:t>2021-04-15</a:t>
+              <a:t>12/1/21</a:t>
             </a:fld>
             <a:endParaRPr lang="en-US"/>
           </a:p>
@@ -3386,7 +3386,7 @@
           <a:p>
             <a:fld id="{DD3575FE-2CC2-2845-A91B-203C440E7198}" type="datetimeFigureOut">
               <a:rPr lang="en-US" smtClean="0"/>
-              <a:t>2021-04-15</a:t>
+              <a:t>12/1/21</a:t>
             </a:fld>
             <a:endParaRPr lang="en-US"/>
           </a:p>
@@ -3424,7 +3424,7 @@
           <a:noFill/>
           <a:extLst>
             <a:ext uri="{909E8E84-426E-40dd-AFC4-6F175D3DCCD1}">
-              <a14:hiddenFill xmlns="" xmlns:a14="http://schemas.microsoft.com/office/drawing/2010/main">
+              <a14:hiddenFill xmlns:a14="http://schemas.microsoft.com/office/drawing/2010/main" xmlns="">
                 <a:solidFill>
                   <a:srgbClr val="FFFFFF"/>
                 </a:solidFill>
@@ -3465,7 +3465,7 @@
           <a:noFill/>
           <a:extLst>
             <a:ext uri="{909E8E84-426E-40dd-AFC4-6F175D3DCCD1}">
-              <a14:hiddenFill xmlns="" xmlns:a14="http://schemas.microsoft.com/office/drawing/2010/main">
+              <a14:hiddenFill xmlns:a14="http://schemas.microsoft.com/office/drawing/2010/main" xmlns="">
                 <a:solidFill>
                   <a:srgbClr val="FFFFFF"/>
                 </a:solidFill>
@@ -4475,7 +4475,7 @@
           <a:noFill/>
           <a:extLst>
             <a:ext uri="{909E8E84-426E-40dd-AFC4-6F175D3DCCD1}">
-              <a14:hiddenFill xmlns="" xmlns:a14="http://schemas.microsoft.com/office/drawing/2010/main">
+              <a14:hiddenFill xmlns:a14="http://schemas.microsoft.com/office/drawing/2010/main" xmlns="">
                 <a:solidFill>
                   <a:srgbClr val="FFFFFF"/>
                 </a:solidFill>
@@ -4514,7 +4514,7 @@
           <a:noFill/>
           <a:extLst>
             <a:ext uri="{909E8E84-426E-40dd-AFC4-6F175D3DCCD1}">
-              <a14:hiddenFill xmlns="" xmlns:a14="http://schemas.microsoft.com/office/drawing/2010/main">
+              <a14:hiddenFill xmlns:a14="http://schemas.microsoft.com/office/drawing/2010/main" xmlns="">
                 <a:solidFill>
                   <a:srgbClr val="FFFFFF"/>
                 </a:solidFill>
@@ -4609,7 +4609,7 @@
           <a:noFill/>
           <a:extLst>
             <a:ext uri="{909E8E84-426E-40dd-AFC4-6F175D3DCCD1}">
-              <a14:hiddenFill xmlns="" xmlns:a14="http://schemas.microsoft.com/office/drawing/2010/main">
+              <a14:hiddenFill xmlns:a14="http://schemas.microsoft.com/office/drawing/2010/main" xmlns="">
                 <a:solidFill>
                   <a:srgbClr val="FFFFFF"/>
                 </a:solidFill>
@@ -4650,7 +4650,7 @@
           <a:noFill/>
           <a:extLst>
             <a:ext uri="{909E8E84-426E-40dd-AFC4-6F175D3DCCD1}">
-              <a14:hiddenFill xmlns="" xmlns:a14="http://schemas.microsoft.com/office/drawing/2010/main">
+              <a14:hiddenFill xmlns:a14="http://schemas.microsoft.com/office/drawing/2010/main" xmlns="">
                 <a:solidFill>
                   <a:srgbClr val="FFFFFF"/>
                 </a:solidFill>
@@ -4695,14 +4695,14 @@
           <a:effectLst/>
           <a:extLst>
             <a:ext uri="{909E8E84-426E-40dd-AFC4-6F175D3DCCD1}">
-              <a14:hiddenFill xmlns="" xmlns:a14="http://schemas.microsoft.com/office/drawing/2010/main">
+              <a14:hiddenFill xmlns:a14="http://schemas.microsoft.com/office/drawing/2010/main" xmlns="">
                 <a:solidFill>
                   <a:schemeClr val="accent1"/>
                 </a:solidFill>
               </a14:hiddenFill>
             </a:ext>
             <a:ext uri="{91240B29-F687-4f45-9708-019B960494DF}">
-              <a14:hiddenLine xmlns="" xmlns:a14="http://schemas.microsoft.com/office/drawing/2010/main" w="9525">
+              <a14:hiddenLine xmlns:a14="http://schemas.microsoft.com/office/drawing/2010/main" xmlns="" w="9525">
                 <a:solidFill>
                   <a:schemeClr val="tx1"/>
                 </a:solidFill>
@@ -4712,7 +4712,7 @@
               </a14:hiddenLine>
             </a:ext>
             <a:ext uri="{AF507438-7753-43e0-B8FC-AC1667EBCBE1}">
-              <a14:hiddenEffects xmlns="" xmlns:a14="http://schemas.microsoft.com/office/drawing/2010/main">
+              <a14:hiddenEffects xmlns:a14="http://schemas.microsoft.com/office/drawing/2010/main" xmlns="">
                 <a:effectLst>
                   <a:outerShdw dist="35921" dir="2700000" algn="ctr" rotWithShape="0">
                     <a:schemeClr val="bg2"/>
@@ -4759,14 +4759,14 @@
           <a:effectLst/>
           <a:extLst>
             <a:ext uri="{909E8E84-426E-40dd-AFC4-6F175D3DCCD1}">
-              <a14:hiddenFill xmlns="" xmlns:a14="http://schemas.microsoft.com/office/drawing/2010/main">
+              <a14:hiddenFill xmlns:a14="http://schemas.microsoft.com/office/drawing/2010/main" xmlns="">
                 <a:solidFill>
                   <a:schemeClr val="accent1"/>
                 </a:solidFill>
               </a14:hiddenFill>
             </a:ext>
             <a:ext uri="{91240B29-F687-4f45-9708-019B960494DF}">
-              <a14:hiddenLine xmlns="" xmlns:a14="http://schemas.microsoft.com/office/drawing/2010/main" w="9525">
+              <a14:hiddenLine xmlns:a14="http://schemas.microsoft.com/office/drawing/2010/main" xmlns="" w="9525">
                 <a:solidFill>
                   <a:schemeClr val="tx1"/>
                 </a:solidFill>
@@ -4776,7 +4776,7 @@
               </a14:hiddenLine>
             </a:ext>
             <a:ext uri="{AF507438-7753-43e0-B8FC-AC1667EBCBE1}">
-              <a14:hiddenEffects xmlns="" xmlns:a14="http://schemas.microsoft.com/office/drawing/2010/main">
+              <a14:hiddenEffects xmlns:a14="http://schemas.microsoft.com/office/drawing/2010/main" xmlns="">
                 <a:effectLst>
                   <a:outerShdw dist="35921" dir="2700000" algn="ctr" rotWithShape="0">
                     <a:schemeClr val="bg2"/>
@@ -5196,7 +5196,7 @@
           <a:noFill/>
           <a:extLst>
             <a:ext uri="{909E8E84-426E-40dd-AFC4-6F175D3DCCD1}">
-              <a14:hiddenFill xmlns="" xmlns:a14="http://schemas.microsoft.com/office/drawing/2010/main">
+              <a14:hiddenFill xmlns:a14="http://schemas.microsoft.com/office/drawing/2010/main" xmlns="">
                 <a:solidFill>
                   <a:srgbClr val="FFFFFF"/>
                 </a:solidFill>
@@ -5235,7 +5235,7 @@
           <a:noFill/>
           <a:extLst>
             <a:ext uri="{909E8E84-426E-40dd-AFC4-6F175D3DCCD1}">
-              <a14:hiddenFill xmlns="" xmlns:a14="http://schemas.microsoft.com/office/drawing/2010/main">
+              <a14:hiddenFill xmlns:a14="http://schemas.microsoft.com/office/drawing/2010/main" xmlns="">
                 <a:solidFill>
                   <a:srgbClr val="FFFFFF"/>
                 </a:solidFill>
@@ -5457,7 +5457,7 @@
           <a:noFill/>
           <a:extLst>
             <a:ext uri="{909E8E84-426E-40dd-AFC4-6F175D3DCCD1}">
-              <a14:hiddenFill xmlns="" xmlns:a14="http://schemas.microsoft.com/office/drawing/2010/main">
+              <a14:hiddenFill xmlns:a14="http://schemas.microsoft.com/office/drawing/2010/main" xmlns="">
                 <a:solidFill>
                   <a:srgbClr val="FFFFFF"/>
                 </a:solidFill>
@@ -5504,7 +5504,7 @@
           <a:noFill/>
           <a:extLst>
             <a:ext uri="{909E8E84-426E-40dd-AFC4-6F175D3DCCD1}">
-              <a14:hiddenFill xmlns="" xmlns:a14="http://schemas.microsoft.com/office/drawing/2010/main">
+              <a14:hiddenFill xmlns:a14="http://schemas.microsoft.com/office/drawing/2010/main" xmlns="">
                 <a:solidFill>
                   <a:srgbClr val="FFFFFF"/>
                 </a:solidFill>
@@ -5555,14 +5555,14 @@
           <a:effectLst/>
           <a:extLst>
             <a:ext uri="{909E8E84-426E-40dd-AFC4-6F175D3DCCD1}">
-              <a14:hiddenFill xmlns="" xmlns:a14="http://schemas.microsoft.com/office/drawing/2010/main">
+              <a14:hiddenFill xmlns:a14="http://schemas.microsoft.com/office/drawing/2010/main" xmlns="">
                 <a:solidFill>
                   <a:schemeClr val="accent1"/>
                 </a:solidFill>
               </a14:hiddenFill>
             </a:ext>
             <a:ext uri="{91240B29-F687-4f45-9708-019B960494DF}">
-              <a14:hiddenLine xmlns="" xmlns:a14="http://schemas.microsoft.com/office/drawing/2010/main" w="9525">
+              <a14:hiddenLine xmlns:a14="http://schemas.microsoft.com/office/drawing/2010/main" xmlns="" w="9525">
                 <a:solidFill>
                   <a:schemeClr val="tx1"/>
                 </a:solidFill>
@@ -5572,7 +5572,7 @@
               </a14:hiddenLine>
             </a:ext>
             <a:ext uri="{AF507438-7753-43e0-B8FC-AC1667EBCBE1}">
-              <a14:hiddenEffects xmlns="" xmlns:a14="http://schemas.microsoft.com/office/drawing/2010/main">
+              <a14:hiddenEffects xmlns:a14="http://schemas.microsoft.com/office/drawing/2010/main" xmlns="">
                 <a:effectLst>
                   <a:outerShdw dist="35921" dir="2700000" algn="ctr" rotWithShape="0">
                     <a:schemeClr val="bg2"/>
@@ -5625,14 +5625,14 @@
           <a:effectLst/>
           <a:extLst>
             <a:ext uri="{909E8E84-426E-40dd-AFC4-6F175D3DCCD1}">
-              <a14:hiddenFill xmlns="" xmlns:a14="http://schemas.microsoft.com/office/drawing/2010/main">
+              <a14:hiddenFill xmlns:a14="http://schemas.microsoft.com/office/drawing/2010/main" xmlns="">
                 <a:solidFill>
                   <a:schemeClr val="accent1"/>
                 </a:solidFill>
               </a14:hiddenFill>
             </a:ext>
             <a:ext uri="{91240B29-F687-4f45-9708-019B960494DF}">
-              <a14:hiddenLine xmlns="" xmlns:a14="http://schemas.microsoft.com/office/drawing/2010/main" w="9525">
+              <a14:hiddenLine xmlns:a14="http://schemas.microsoft.com/office/drawing/2010/main" xmlns="" w="9525">
                 <a:solidFill>
                   <a:schemeClr val="tx1"/>
                 </a:solidFill>
@@ -5642,7 +5642,7 @@
               </a14:hiddenLine>
             </a:ext>
             <a:ext uri="{AF507438-7753-43e0-B8FC-AC1667EBCBE1}">
-              <a14:hiddenEffects xmlns="" xmlns:a14="http://schemas.microsoft.com/office/drawing/2010/main">
+              <a14:hiddenEffects xmlns:a14="http://schemas.microsoft.com/office/drawing/2010/main" xmlns="">
                 <a:effectLst>
                   <a:outerShdw dist="35921" dir="2700000" algn="ctr" rotWithShape="0">
                     <a:schemeClr val="bg2"/>
@@ -5817,7 +5817,7 @@
           <a:p>
             <a:fld id="{DD3575FE-2CC2-2845-A91B-203C440E7198}" type="datetimeFigureOut">
               <a:rPr lang="en-US" smtClean="0"/>
-              <a:t>2021-04-15</a:t>
+              <a:t>12/1/21</a:t>
             </a:fld>
             <a:endParaRPr lang="en-US"/>
           </a:p>
@@ -6073,7 +6073,7 @@
           <a:p>
             <a:fld id="{DD3575FE-2CC2-2845-A91B-203C440E7198}" type="datetimeFigureOut">
               <a:rPr lang="en-US" smtClean="0"/>
-              <a:t>2021-04-15</a:t>
+              <a:t>12/1/21</a:t>
             </a:fld>
             <a:endParaRPr lang="en-US"/>
           </a:p>
@@ -6374,7 +6374,7 @@
           <a:p>
             <a:fld id="{DD3575FE-2CC2-2845-A91B-203C440E7198}" type="datetimeFigureOut">
               <a:rPr lang="en-US" smtClean="0"/>
-              <a:t>2021-04-15</a:t>
+              <a:t>12/1/21</a:t>
             </a:fld>
             <a:endParaRPr lang="en-US"/>
           </a:p>
@@ -6821,7 +6821,7 @@
           <a:p>
             <a:fld id="{DD3575FE-2CC2-2845-A91B-203C440E7198}" type="datetimeFigureOut">
               <a:rPr lang="en-US" smtClean="0"/>
-              <a:t>2021-04-15</a:t>
+              <a:t>12/1/21</a:t>
             </a:fld>
             <a:endParaRPr lang="en-US"/>
           </a:p>
@@ -6954,7 +6954,7 @@
           <a:p>
             <a:fld id="{DD3575FE-2CC2-2845-A91B-203C440E7198}" type="datetimeFigureOut">
               <a:rPr lang="en-US" smtClean="0"/>
-              <a:t>2021-04-15</a:t>
+              <a:t>12/1/21</a:t>
             </a:fld>
             <a:endParaRPr lang="en-US"/>
           </a:p>
@@ -7060,7 +7060,7 @@
           <a:p>
             <a:fld id="{DD3575FE-2CC2-2845-A91B-203C440E7198}" type="datetimeFigureOut">
               <a:rPr lang="en-US" smtClean="0"/>
-              <a:t>2021-04-15</a:t>
+              <a:t>12/1/21</a:t>
             </a:fld>
             <a:endParaRPr lang="en-US"/>
           </a:p>
@@ -7409,7 +7409,7 @@
           <a:p>
             <a:fld id="{DD3575FE-2CC2-2845-A91B-203C440E7198}" type="datetimeFigureOut">
               <a:rPr lang="en-US" smtClean="0"/>
-              <a:t>2021-04-15</a:t>
+              <a:t>12/1/21</a:t>
             </a:fld>
             <a:endParaRPr lang="en-US"/>
           </a:p>
@@ -7882,35 +7882,41 @@
         </p:nvSpPr>
         <p:spPr>
           <a:xfrm>
-            <a:off x="628650" y="2226469"/>
-            <a:ext cx="7886700" cy="716365"/>
+            <a:off x="707082" y="1395387"/>
+            <a:ext cx="4157018" cy="2147159"/>
           </a:xfrm>
         </p:spPr>
         <p:txBody>
           <a:bodyPr>
-            <a:normAutofit fontScale="77500" lnSpcReduction="20000"/>
+            <a:normAutofit/>
           </a:bodyPr>
           <a:lstStyle/>
           <a:p>
             <a:r>
-              <a:rPr lang="en-GB"/>
+              <a:rPr lang="en-GB" sz="1600" dirty="0"/>
               <a:t>The transpose of a matrix is where the first </a:t>
             </a:r>
             <a:r>
-              <a:rPr lang="en-GB" i="1"/>
+              <a:rPr lang="en-GB" sz="1600" i="1" dirty="0"/>
               <a:t>row </a:t>
             </a:r>
             <a:r>
-              <a:rPr lang="en-GB"/>
+              <a:rPr lang="en-GB" sz="1600" dirty="0"/>
               <a:t>of the original matrix becomes the first </a:t>
             </a:r>
             <a:r>
-              <a:rPr lang="en-GB" i="1"/>
+              <a:rPr lang="en-GB" sz="1600" i="1" dirty="0"/>
               <a:t>column </a:t>
             </a:r>
             <a:r>
-              <a:rPr lang="en-GB"/>
-              <a:t>of the transposed matrix.</a:t>
+              <a:rPr lang="en-GB" sz="1600" dirty="0"/>
+              <a:t>of the transposed matrix</a:t>
+            </a:r>
+          </a:p>
+          <a:p>
+            <a:r>
+              <a:rPr lang="en-GB" sz="1600" dirty="0"/>
+              <a:t>This is sometimes required to match the dimensions of matrices for calculations</a:t>
             </a:r>
           </a:p>
         </p:txBody>
@@ -7930,13 +7936,13 @@
           <p:nvPr>
             <p:extLst>
               <p:ext uri="{D42A27DB-BD31-4B8C-83A1-F6EECF244321}">
-                <p14:modId xmlns:p14="http://schemas.microsoft.com/office/powerpoint/2010/main" val="416688009"/>
+                <p14:modId xmlns:p14="http://schemas.microsoft.com/office/powerpoint/2010/main" val="4195373183"/>
               </p:ext>
             </p:extLst>
           </p:nvPr>
         </p:nvGraphicFramePr>
         <p:xfrm>
-          <a:off x="2185862" y="3100884"/>
+          <a:off x="2698336" y="3582075"/>
           <a:ext cx="892472" cy="1608715"/>
         </p:xfrm>
         <a:graphic>
@@ -8442,7 +8448,7 @@
         </p:nvSpPr>
         <p:spPr>
           <a:xfrm>
-            <a:off x="2232090" y="3081119"/>
+            <a:off x="2744564" y="3562310"/>
             <a:ext cx="892472" cy="1608716"/>
           </a:xfrm>
           <a:prstGeom prst="bracketPair">
@@ -8487,8 +8493,8 @@
         </p:nvSpPr>
         <p:spPr>
           <a:xfrm>
-            <a:off x="1425529" y="3582075"/>
-            <a:ext cx="470321" cy="646331"/>
+            <a:off x="1632935" y="4063266"/>
+            <a:ext cx="775389" cy="369332"/>
           </a:xfrm>
           <a:prstGeom prst="rect">
             <a:avLst/>
@@ -8524,10 +8530,16 @@
           <p:cNvGraphicFramePr>
             <a:graphicFrameLocks/>
           </p:cNvGraphicFramePr>
-          <p:nvPr/>
+          <p:nvPr>
+            <p:extLst>
+              <p:ext uri="{D42A27DB-BD31-4B8C-83A1-F6EECF244321}">
+                <p14:modId xmlns:p14="http://schemas.microsoft.com/office/powerpoint/2010/main" val="2670769255"/>
+              </p:ext>
+            </p:extLst>
+          </p:nvPr>
         </p:nvGraphicFramePr>
         <p:xfrm>
-          <a:off x="1380940" y="5025767"/>
+          <a:off x="1893414" y="5506958"/>
           <a:ext cx="2346750" cy="643486"/>
         </p:xfrm>
         <a:graphic>
@@ -9177,7 +9189,7 @@
         </p:nvSpPr>
         <p:spPr>
           <a:xfrm>
-            <a:off x="1380940" y="5025767"/>
+            <a:off x="1893414" y="5506958"/>
             <a:ext cx="2346750" cy="643487"/>
           </a:xfrm>
           <a:prstGeom prst="bracketPair">
@@ -9222,8 +9234,8 @@
         </p:nvSpPr>
         <p:spPr>
           <a:xfrm>
-            <a:off x="775140" y="5111924"/>
-            <a:ext cx="605800" cy="646331"/>
+            <a:off x="947940" y="5593115"/>
+            <a:ext cx="752290" cy="369332"/>
           </a:xfrm>
           <a:prstGeom prst="rect">
             <a:avLst/>
@@ -9276,14 +9288,69 @@
         </p:blipFill>
         <p:spPr>
           <a:xfrm>
-            <a:off x="4572001" y="3092903"/>
-            <a:ext cx="3776597" cy="2579931"/>
+            <a:off x="5035065" y="3770274"/>
+            <a:ext cx="3308835" cy="2260386"/>
           </a:xfrm>
           <a:prstGeom prst="rect">
             <a:avLst/>
           </a:prstGeom>
+          <a:ln/>
         </p:spPr>
+        <p:style>
+          <a:lnRef idx="2">
+            <a:schemeClr val="accent1"/>
+          </a:lnRef>
+          <a:fillRef idx="1">
+            <a:schemeClr val="lt1"/>
+          </a:fillRef>
+          <a:effectRef idx="0">
+            <a:schemeClr val="accent1"/>
+          </a:effectRef>
+          <a:fontRef idx="minor">
+            <a:schemeClr val="dk1"/>
+          </a:fontRef>
+        </p:style>
       </p:pic>
+      <p:sp>
+        <p:nvSpPr>
+          <p:cNvPr id="12" name="TextBox 11">
+            <a:extLst>
+              <a:ext uri="{FF2B5EF4-FFF2-40B4-BE49-F238E27FC236}">
+                <a16:creationId xmlns:a16="http://schemas.microsoft.com/office/drawing/2014/main" id="{71741811-A409-CB41-81B5-D123B368F8D0}"/>
+              </a:ext>
+            </a:extLst>
+          </p:cNvPr>
+          <p:cNvSpPr txBox="1"/>
+          <p:nvPr/>
+        </p:nvSpPr>
+        <p:spPr>
+          <a:xfrm>
+            <a:off x="5035064" y="3212743"/>
+            <a:ext cx="3776597" cy="369332"/>
+          </a:xfrm>
+          <a:prstGeom prst="rect">
+            <a:avLst/>
+          </a:prstGeom>
+          <a:noFill/>
+          <a:ln>
+            <a:solidFill>
+              <a:schemeClr val="accent1"/>
+            </a:solidFill>
+          </a:ln>
+        </p:spPr>
+        <p:txBody>
+          <a:bodyPr wrap="square" rtlCol="0">
+            <a:spAutoFit/>
+          </a:bodyPr>
+          <a:lstStyle/>
+          <a:p>
+            <a:r>
+              <a:rPr lang="en-US" dirty="0"/>
+              <a:t>In R</a:t>
+            </a:r>
+          </a:p>
+        </p:txBody>
+      </p:sp>
     </p:spTree>
     <p:extLst>
       <p:ext uri="{BB962C8B-B14F-4D97-AF65-F5344CB8AC3E}">
@@ -9538,14 +9605,19 @@
             <p:ph type="title"/>
           </p:nvPr>
         </p:nvSpPr>
-        <p:spPr/>
+        <p:spPr>
+          <a:xfrm>
+            <a:off x="840432" y="274638"/>
+            <a:ext cx="8191500" cy="1143000"/>
+          </a:xfrm>
+        </p:spPr>
         <p:txBody>
           <a:bodyPr/>
           <a:lstStyle/>
           <a:p>
             <a:r>
-              <a:rPr lang="en-US" dirty="0"/>
-              <a:t>Decision analysis calculations</a:t>
+              <a:rPr lang="en-US" sz="2800" b="1" dirty="0"/>
+              <a:t>Why matrix algebra a decision analysis? </a:t>
             </a:r>
           </a:p>
         </p:txBody>
@@ -9572,7 +9644,7 @@
         </p:blipFill>
         <p:spPr>
           <a:xfrm>
-            <a:off x="952500" y="1417639"/>
+            <a:off x="952500" y="2744169"/>
             <a:ext cx="3714393" cy="3205162"/>
           </a:xfrm>
           <a:prstGeom prst="rect">
@@ -9594,8 +9666,8 @@
         </p:nvGrpSpPr>
         <p:grpSpPr>
           <a:xfrm>
-            <a:off x="5072714" y="1932246"/>
-            <a:ext cx="3712511" cy="2340087"/>
+            <a:off x="5241700" y="3039835"/>
+            <a:ext cx="3559399" cy="1959187"/>
             <a:chOff x="2368023" y="2307251"/>
             <a:chExt cx="4950756" cy="3351655"/>
           </a:xfrm>
@@ -10076,8 +10148,8 @@
         </p:nvSpPr>
         <p:spPr>
           <a:xfrm>
-            <a:off x="2078694" y="5435760"/>
-            <a:ext cx="7065306" cy="369332"/>
+            <a:off x="4778960" y="5364555"/>
+            <a:ext cx="4365040" cy="1169551"/>
           </a:xfrm>
           <a:prstGeom prst="rect">
             <a:avLst/>
@@ -10092,180 +10164,400 @@
           </a:bodyPr>
           <a:lstStyle/>
           <a:p>
-            <a:pPr algn="ctr"/>
-            <a:r>
-              <a:rPr lang="en-US" i="1" dirty="0">
+            <a:r>
+              <a:rPr lang="en-US" sz="1400" dirty="0">
+                <a:latin typeface="Calibri" panose="020F0502020204030204" pitchFamily="34" charset="0"/>
+              </a:rPr>
+              <a:t>Estimation of proportion in a specific health states also involves multiplication and summation.</a:t>
+            </a:r>
+          </a:p>
+          <a:p>
+            <a:r>
+              <a:rPr lang="en-US" sz="1400" dirty="0">
+                <a:latin typeface="Calibri" panose="020F0502020204030204" pitchFamily="34" charset="0"/>
+              </a:rPr>
+              <a:t># people in sick = </a:t>
+            </a:r>
+            <a:endParaRPr lang="en-US" sz="1400" i="1" dirty="0">
+              <a:latin typeface="Calibri" panose="020F0502020204030204" pitchFamily="34" charset="0"/>
+            </a:endParaRPr>
+          </a:p>
+          <a:p>
+            <a:r>
+              <a:rPr lang="en-US" sz="1400" i="1" dirty="0">
                 <a:latin typeface="Calibri" panose="020F0502020204030204" pitchFamily="34" charset="0"/>
               </a:rPr>
               <a:t>(</a:t>
             </a:r>
             <a:r>
-              <a:rPr lang="en-US" i="1" dirty="0" err="1">
+              <a:rPr lang="en-US" sz="1400" i="1" dirty="0" err="1">
                 <a:latin typeface="Calibri" panose="020F0502020204030204" pitchFamily="34" charset="0"/>
               </a:rPr>
               <a:t>p</a:t>
             </a:r>
             <a:r>
-              <a:rPr lang="en-US" i="1" baseline="-25000" dirty="0" err="1">
+              <a:rPr lang="en-US" sz="1400" i="1" baseline="-25000" dirty="0" err="1">
                 <a:latin typeface="Calibri" panose="020F0502020204030204" pitchFamily="34" charset="0"/>
               </a:rPr>
               <a:t>Sick,Sick</a:t>
             </a:r>
             <a:r>
-              <a:rPr lang="en-US" i="1" dirty="0">
+              <a:rPr lang="en-US" sz="1400" i="1" dirty="0">
                 <a:latin typeface="Calibri" panose="020F0502020204030204" pitchFamily="34" charset="0"/>
               </a:rPr>
               <a:t> </a:t>
             </a:r>
             <a:r>
-              <a:rPr lang="en-US" dirty="0">
+              <a:rPr lang="en-US" sz="1400" dirty="0">
                 <a:latin typeface="Calibri" panose="020F0502020204030204" pitchFamily="34" charset="0"/>
               </a:rPr>
               <a:t>)*</a:t>
             </a:r>
             <a:r>
-              <a:rPr lang="en-US" dirty="0" err="1">
+              <a:rPr lang="en-US" sz="1400" dirty="0" err="1">
                 <a:latin typeface="Calibri" panose="020F0502020204030204" pitchFamily="34" charset="0"/>
               </a:rPr>
               <a:t>Pr</a:t>
             </a:r>
             <a:r>
-              <a:rPr lang="en-US" dirty="0">
+              <a:rPr lang="en-US" sz="1400" dirty="0">
                 <a:latin typeface="Calibri" panose="020F0502020204030204" pitchFamily="34" charset="0"/>
               </a:rPr>
               <a:t>(</a:t>
             </a:r>
             <a:r>
-              <a:rPr lang="en-US" i="1" dirty="0">
+              <a:rPr lang="en-US" sz="1400" i="1" dirty="0">
                 <a:latin typeface="Calibri" panose="020F0502020204030204" pitchFamily="34" charset="0"/>
               </a:rPr>
               <a:t>Sick</a:t>
             </a:r>
             <a:r>
-              <a:rPr lang="en-US" dirty="0">
+              <a:rPr lang="en-US" sz="1400" dirty="0">
                 <a:latin typeface="Calibri" panose="020F0502020204030204" pitchFamily="34" charset="0"/>
               </a:rPr>
-              <a:t>) + </a:t>
-            </a:r>
-            <a:r>
-              <a:rPr lang="en-US" i="1" dirty="0">
+              <a:t>) +  </a:t>
+            </a:r>
+            <a:r>
+              <a:rPr lang="en-US" sz="1400" i="1" dirty="0">
                 <a:latin typeface="Calibri" panose="020F0502020204030204" pitchFamily="34" charset="0"/>
               </a:rPr>
               <a:t>(</a:t>
             </a:r>
             <a:r>
-              <a:rPr lang="en-US" i="1" dirty="0" err="1">
+              <a:rPr lang="en-US" sz="1400" i="1" dirty="0" err="1">
                 <a:latin typeface="Calibri" panose="020F0502020204030204" pitchFamily="34" charset="0"/>
               </a:rPr>
               <a:t>p</a:t>
             </a:r>
             <a:r>
-              <a:rPr lang="en-US" i="1" baseline="-25000" dirty="0" err="1">
+              <a:rPr lang="en-US" sz="1400" i="1" baseline="-25000" dirty="0" err="1">
                 <a:latin typeface="Calibri" panose="020F0502020204030204" pitchFamily="34" charset="0"/>
               </a:rPr>
               <a:t>Healthy</a:t>
             </a:r>
             <a:r>
-              <a:rPr lang="en-US" i="1" baseline="-25000" dirty="0">
+              <a:rPr lang="en-US" sz="1400" i="1" baseline="-25000" dirty="0">
                 <a:latin typeface="Calibri" panose="020F0502020204030204" pitchFamily="34" charset="0"/>
               </a:rPr>
               <a:t>, Sick</a:t>
             </a:r>
             <a:r>
-              <a:rPr lang="en-US" i="1" dirty="0">
+              <a:rPr lang="en-US" sz="1400" dirty="0">
+                <a:latin typeface="Calibri" panose="020F0502020204030204" pitchFamily="34" charset="0"/>
+              </a:rPr>
+              <a:t>)*</a:t>
+            </a:r>
+            <a:r>
+              <a:rPr lang="en-US" sz="1400" dirty="0" err="1">
+                <a:latin typeface="Calibri" panose="020F0502020204030204" pitchFamily="34" charset="0"/>
+              </a:rPr>
+              <a:t>Pr</a:t>
+            </a:r>
+            <a:r>
+              <a:rPr lang="en-US" sz="1400" dirty="0">
+                <a:latin typeface="Calibri" panose="020F0502020204030204" pitchFamily="34" charset="0"/>
+              </a:rPr>
+              <a:t>(</a:t>
+            </a:r>
+            <a:r>
+              <a:rPr lang="en-US" sz="1400" i="1" dirty="0">
+                <a:latin typeface="Calibri" panose="020F0502020204030204" pitchFamily="34" charset="0"/>
+              </a:rPr>
+              <a:t>Healthy</a:t>
+            </a:r>
+            <a:r>
+              <a:rPr lang="en-US" sz="1400" dirty="0">
+                <a:latin typeface="Calibri" panose="020F0502020204030204" pitchFamily="34" charset="0"/>
+              </a:rPr>
+              <a:t>) +</a:t>
+            </a:r>
+          </a:p>
+          <a:p>
+            <a:r>
+              <a:rPr lang="en-US" sz="1400" dirty="0">
                 <a:latin typeface="Calibri" panose="020F0502020204030204" pitchFamily="34" charset="0"/>
               </a:rPr>
               <a:t> </a:t>
             </a:r>
             <a:r>
-              <a:rPr lang="en-US" dirty="0">
+              <a:rPr lang="en-US" sz="1400" i="1" dirty="0">
+                <a:latin typeface="Calibri" panose="020F0502020204030204" pitchFamily="34" charset="0"/>
+              </a:rPr>
+              <a:t>(</a:t>
+            </a:r>
+            <a:r>
+              <a:rPr lang="en-US" sz="1400" i="1" dirty="0" err="1">
+                <a:latin typeface="Calibri" panose="020F0502020204030204" pitchFamily="34" charset="0"/>
+              </a:rPr>
+              <a:t>p</a:t>
+            </a:r>
+            <a:r>
+              <a:rPr lang="en-US" sz="1400" i="1" baseline="-25000" dirty="0" err="1">
+                <a:latin typeface="Calibri" panose="020F0502020204030204" pitchFamily="34" charset="0"/>
+              </a:rPr>
+              <a:t>Dead</a:t>
+            </a:r>
+            <a:r>
+              <a:rPr lang="en-US" sz="1400" i="1" baseline="-25000" dirty="0">
+                <a:latin typeface="Calibri" panose="020F0502020204030204" pitchFamily="34" charset="0"/>
+              </a:rPr>
+              <a:t>, sick</a:t>
+            </a:r>
+            <a:r>
+              <a:rPr lang="en-US" sz="1400" dirty="0">
                 <a:latin typeface="Calibri" panose="020F0502020204030204" pitchFamily="34" charset="0"/>
               </a:rPr>
               <a:t>)*</a:t>
             </a:r>
             <a:r>
-              <a:rPr lang="en-US" dirty="0" err="1">
+              <a:rPr lang="en-US" sz="1400" dirty="0" err="1">
                 <a:latin typeface="Calibri" panose="020F0502020204030204" pitchFamily="34" charset="0"/>
               </a:rPr>
               <a:t>Pr</a:t>
             </a:r>
             <a:r>
-              <a:rPr lang="en-US" dirty="0">
+              <a:rPr lang="en-US" sz="1400" dirty="0">
                 <a:latin typeface="Calibri" panose="020F0502020204030204" pitchFamily="34" charset="0"/>
               </a:rPr>
               <a:t>(</a:t>
             </a:r>
             <a:r>
-              <a:rPr lang="en-US" i="1" dirty="0">
+              <a:rPr lang="en-US" sz="1400" i="1" dirty="0">
                 <a:latin typeface="Calibri" panose="020F0502020204030204" pitchFamily="34" charset="0"/>
               </a:rPr>
-              <a:t>Healthy</a:t>
-            </a:r>
-            <a:r>
-              <a:rPr lang="en-US" dirty="0">
+              <a:t>Dead</a:t>
+            </a:r>
+            <a:r>
+              <a:rPr lang="en-US" sz="1400" dirty="0">
                 <a:latin typeface="Calibri" panose="020F0502020204030204" pitchFamily="34" charset="0"/>
               </a:rPr>
-              <a:t>) + </a:t>
-            </a:r>
-            <a:r>
-              <a:rPr lang="en-US" i="1" dirty="0">
+              <a:t>) – </a:t>
+            </a:r>
+            <a:r>
+              <a:rPr lang="en-US" sz="1400" i="1" dirty="0">
                 <a:latin typeface="Calibri" panose="020F0502020204030204" pitchFamily="34" charset="0"/>
               </a:rPr>
               <a:t>(</a:t>
             </a:r>
             <a:r>
-              <a:rPr lang="en-US" i="1" dirty="0" err="1">
+              <a:rPr lang="en-US" sz="1400" i="1" dirty="0" err="1">
                 <a:latin typeface="Calibri" panose="020F0502020204030204" pitchFamily="34" charset="0"/>
               </a:rPr>
               <a:t>p</a:t>
             </a:r>
             <a:r>
-              <a:rPr lang="en-US" i="1" baseline="-25000" dirty="0" err="1">
+              <a:rPr lang="en-US" sz="1400" i="1" baseline="-25000" dirty="0" err="1">
                 <a:latin typeface="Calibri" panose="020F0502020204030204" pitchFamily="34" charset="0"/>
               </a:rPr>
-              <a:t>Dead</a:t>
-            </a:r>
-            <a:r>
-              <a:rPr lang="en-US" i="1" baseline="-25000" dirty="0">
+              <a:t>sick</a:t>
+            </a:r>
+            <a:r>
+              <a:rPr lang="en-US" sz="1400" i="1" baseline="-25000" dirty="0">
                 <a:latin typeface="Calibri" panose="020F0502020204030204" pitchFamily="34" charset="0"/>
               </a:rPr>
-              <a:t>, sick</a:t>
-            </a:r>
-            <a:r>
-              <a:rPr lang="en-US" i="1" dirty="0">
+              <a:t>, dead</a:t>
+            </a:r>
+            <a:r>
+              <a:rPr lang="en-US" sz="1400" i="1" dirty="0">
                 <a:latin typeface="Calibri" panose="020F0502020204030204" pitchFamily="34" charset="0"/>
               </a:rPr>
               <a:t> </a:t>
             </a:r>
             <a:r>
-              <a:rPr lang="en-US" dirty="0">
+              <a:rPr lang="en-US" sz="1400" dirty="0">
                 <a:latin typeface="Calibri" panose="020F0502020204030204" pitchFamily="34" charset="0"/>
               </a:rPr>
               <a:t>)*</a:t>
             </a:r>
             <a:r>
-              <a:rPr lang="en-US" dirty="0" err="1">
+              <a:rPr lang="en-US" sz="1400" dirty="0" err="1">
                 <a:latin typeface="Calibri" panose="020F0502020204030204" pitchFamily="34" charset="0"/>
               </a:rPr>
               <a:t>Pr</a:t>
             </a:r>
             <a:r>
-              <a:rPr lang="en-US" dirty="0">
+              <a:rPr lang="en-US" sz="1400" dirty="0">
                 <a:latin typeface="Calibri" panose="020F0502020204030204" pitchFamily="34" charset="0"/>
               </a:rPr>
               <a:t>(</a:t>
             </a:r>
             <a:r>
-              <a:rPr lang="en-US" i="1" dirty="0">
+              <a:rPr lang="en-US" sz="1400" i="1" dirty="0">
                 <a:latin typeface="Calibri" panose="020F0502020204030204" pitchFamily="34" charset="0"/>
               </a:rPr>
-              <a:t>Dead</a:t>
-            </a:r>
-            <a:r>
-              <a:rPr lang="en-US" dirty="0">
+              <a:t>Sick</a:t>
+            </a:r>
+            <a:r>
+              <a:rPr lang="en-US" sz="1400" dirty="0">
                 <a:latin typeface="Calibri" panose="020F0502020204030204" pitchFamily="34" charset="0"/>
               </a:rPr>
-              <a:t>) </a:t>
+              <a:t>)</a:t>
+            </a:r>
+          </a:p>
+        </p:txBody>
+      </p:sp>
+      <p:sp>
+        <p:nvSpPr>
+          <p:cNvPr id="3" name="TextBox 2">
+            <a:extLst>
+              <a:ext uri="{FF2B5EF4-FFF2-40B4-BE49-F238E27FC236}">
+                <a16:creationId xmlns:a16="http://schemas.microsoft.com/office/drawing/2014/main" id="{ABA735E3-07D9-9749-B56D-7AAAD8A8B680}"/>
+              </a:ext>
+            </a:extLst>
+          </p:cNvPr>
+          <p:cNvSpPr txBox="1"/>
+          <p:nvPr/>
+        </p:nvSpPr>
+        <p:spPr>
+          <a:xfrm>
+            <a:off x="840432" y="1251843"/>
+            <a:ext cx="8191500" cy="646331"/>
+          </a:xfrm>
+          <a:prstGeom prst="rect">
+            <a:avLst/>
+          </a:prstGeom>
+          <a:noFill/>
+        </p:spPr>
+        <p:txBody>
+          <a:bodyPr wrap="square" rtlCol="0">
+            <a:spAutoFit/>
+          </a:bodyPr>
+          <a:lstStyle/>
+          <a:p>
+            <a:r>
+              <a:rPr lang="en-US" dirty="0"/>
+              <a:t>Calculations in decision analysis involve a lot of multiplying and adding one of the strengths of matrix algebra</a:t>
+            </a:r>
+          </a:p>
+        </p:txBody>
+      </p:sp>
+      <p:sp>
+        <p:nvSpPr>
+          <p:cNvPr id="4" name="TextBox 3">
+            <a:extLst>
+              <a:ext uri="{FF2B5EF4-FFF2-40B4-BE49-F238E27FC236}">
+                <a16:creationId xmlns:a16="http://schemas.microsoft.com/office/drawing/2014/main" id="{B422008D-6083-2849-B606-44F951FA96CE}"/>
+              </a:ext>
+            </a:extLst>
+          </p:cNvPr>
+          <p:cNvSpPr txBox="1"/>
+          <p:nvPr/>
+        </p:nvSpPr>
+        <p:spPr>
+          <a:xfrm>
+            <a:off x="840432" y="6095832"/>
+            <a:ext cx="3680688" cy="523220"/>
+          </a:xfrm>
+          <a:prstGeom prst="rect">
+            <a:avLst/>
+          </a:prstGeom>
+          <a:noFill/>
+        </p:spPr>
+        <p:txBody>
+          <a:bodyPr wrap="none" rtlCol="0">
+            <a:spAutoFit/>
+          </a:bodyPr>
+          <a:lstStyle/>
+          <a:p>
+            <a:r>
+              <a:rPr lang="en-US" sz="1400" dirty="0"/>
+              <a:t>Folding back method in decision trees:</a:t>
+            </a:r>
+          </a:p>
+          <a:p>
+            <a:r>
+              <a:rPr lang="en-US" sz="1400" dirty="0"/>
+              <a:t>Involves multiplication and summation</a:t>
+            </a:r>
+          </a:p>
+        </p:txBody>
+      </p:sp>
+      <p:sp>
+        <p:nvSpPr>
+          <p:cNvPr id="5" name="TextBox 4">
+            <a:extLst>
+              <a:ext uri="{FF2B5EF4-FFF2-40B4-BE49-F238E27FC236}">
+                <a16:creationId xmlns:a16="http://schemas.microsoft.com/office/drawing/2014/main" id="{42EB3112-C69C-774A-9424-057EA31A1BA1}"/>
+              </a:ext>
+            </a:extLst>
+          </p:cNvPr>
+          <p:cNvSpPr txBox="1"/>
+          <p:nvPr/>
+        </p:nvSpPr>
+        <p:spPr>
+          <a:xfrm>
+            <a:off x="1712890" y="2233026"/>
+            <a:ext cx="1891865" cy="369332"/>
+          </a:xfrm>
+          <a:prstGeom prst="rect">
+            <a:avLst/>
+          </a:prstGeom>
+          <a:noFill/>
+        </p:spPr>
+        <p:txBody>
+          <a:bodyPr wrap="none" rtlCol="0">
+            <a:spAutoFit/>
+          </a:bodyPr>
+          <a:lstStyle/>
+          <a:p>
+            <a:r>
+              <a:rPr lang="en-US" b="1" dirty="0"/>
+              <a:t>Decision tree</a:t>
+            </a:r>
+          </a:p>
+        </p:txBody>
+      </p:sp>
+      <p:sp>
+        <p:nvSpPr>
+          <p:cNvPr id="18" name="TextBox 17">
+            <a:extLst>
+              <a:ext uri="{FF2B5EF4-FFF2-40B4-BE49-F238E27FC236}">
+                <a16:creationId xmlns:a16="http://schemas.microsoft.com/office/drawing/2014/main" id="{44A773AD-B639-2641-8C83-872939C4E91E}"/>
+              </a:ext>
+            </a:extLst>
+          </p:cNvPr>
+          <p:cNvSpPr txBox="1"/>
+          <p:nvPr/>
+        </p:nvSpPr>
+        <p:spPr>
+          <a:xfrm>
+            <a:off x="5433397" y="2233026"/>
+            <a:ext cx="3755238" cy="369332"/>
+          </a:xfrm>
+          <a:prstGeom prst="rect">
+            <a:avLst/>
+          </a:prstGeom>
+          <a:noFill/>
+        </p:spPr>
+        <p:txBody>
+          <a:bodyPr wrap="square" rtlCol="0">
+            <a:spAutoFit/>
+          </a:bodyPr>
+          <a:lstStyle/>
+          <a:p>
+            <a:r>
+              <a:rPr lang="en-US" b="1" dirty="0"/>
+              <a:t>State-transition model</a:t>
             </a:r>
           </a:p>
         </p:txBody>
@@ -10421,38 +10713,10 @@
             <p:ph type="title"/>
           </p:nvPr>
         </p:nvSpPr>
-        <p:spPr/>
-        <p:txBody>
-          <a:bodyPr/>
-          <a:lstStyle/>
-          <a:p>
-            <a:r>
-              <a:rPr lang="en-GB"/>
-              <a:t>Matrix Addition and Subtraction</a:t>
-            </a:r>
-          </a:p>
-        </p:txBody>
-      </p:sp>
-      <p:sp>
-        <p:nvSpPr>
-          <p:cNvPr id="3" name="Content Placeholder 2">
-            <a:extLst>
-              <a:ext uri="{FF2B5EF4-FFF2-40B4-BE49-F238E27FC236}">
-                <a16:creationId xmlns:a16="http://schemas.microsoft.com/office/drawing/2014/main" id="{77D45481-E100-4D4F-9586-F8AEAA56927C}"/>
-              </a:ext>
-            </a:extLst>
-          </p:cNvPr>
-          <p:cNvSpPr>
-            <a:spLocks noGrp="1"/>
-          </p:cNvSpPr>
-          <p:nvPr>
-            <p:ph idx="1"/>
-          </p:nvPr>
-        </p:nvSpPr>
         <p:spPr>
           <a:xfrm>
-            <a:off x="570624" y="3938289"/>
-            <a:ext cx="4001376" cy="3263504"/>
+            <a:off x="840431" y="274638"/>
+            <a:ext cx="8189327" cy="1143000"/>
           </a:xfrm>
         </p:spPr>
         <p:txBody>
@@ -10461,21 +10725,7 @@
           <a:p>
             <a:r>
               <a:rPr lang="en-GB" dirty="0"/>
-              <a:t>Matrix addition and subtraction are </a:t>
-            </a:r>
-            <a:r>
-              <a:rPr lang="en-GB" i="1" dirty="0"/>
-              <a:t>element-wise </a:t>
-            </a:r>
-            <a:r>
-              <a:rPr lang="en-GB" dirty="0"/>
-              <a:t>operations.</a:t>
-            </a:r>
-          </a:p>
-          <a:p>
-            <a:r>
-              <a:rPr lang="en-GB" dirty="0"/>
-              <a:t>Only matrices with the same dimensions can be added/subtracted</a:t>
+              <a:t>Matrix Addition and Subtraction</a:t>
             </a:r>
           </a:p>
         </p:txBody>
@@ -10492,10 +10742,16 @@
           <p:cNvGraphicFramePr>
             <a:graphicFrameLocks/>
           </p:cNvGraphicFramePr>
-          <p:nvPr/>
+          <p:nvPr>
+            <p:extLst>
+              <p:ext uri="{D42A27DB-BD31-4B8C-83A1-F6EECF244321}">
+                <p14:modId xmlns:p14="http://schemas.microsoft.com/office/powerpoint/2010/main" val="2835119436"/>
+              </p:ext>
+            </p:extLst>
+          </p:nvPr>
         </p:nvGraphicFramePr>
         <p:xfrm>
-          <a:off x="791230" y="2125267"/>
+          <a:off x="1032530" y="4299926"/>
           <a:ext cx="892472" cy="1608715"/>
         </p:xfrm>
         <a:graphic>
@@ -10756,7 +11012,7 @@
                     <a:p>
                       <a:pPr algn="ctr"/>
                       <a:r>
-                        <a:rPr lang="en-GB" sz="1400">
+                        <a:rPr lang="en-GB" sz="1400" dirty="0">
                           <a:solidFill>
                             <a:schemeClr val="accent1">
                               <a:lumMod val="75000"/>
@@ -11001,7 +11257,7 @@
         </p:nvSpPr>
         <p:spPr>
           <a:xfrm>
-            <a:off x="791230" y="2125267"/>
+            <a:off x="1032530" y="4299926"/>
             <a:ext cx="892472" cy="1608716"/>
           </a:xfrm>
           <a:prstGeom prst="bracketPair">
@@ -11044,10 +11300,16 @@
           <p:cNvGraphicFramePr>
             <a:graphicFrameLocks/>
           </p:cNvGraphicFramePr>
-          <p:nvPr/>
+          <p:nvPr>
+            <p:extLst>
+              <p:ext uri="{D42A27DB-BD31-4B8C-83A1-F6EECF244321}">
+                <p14:modId xmlns:p14="http://schemas.microsoft.com/office/powerpoint/2010/main" val="1387545678"/>
+              </p:ext>
+            </p:extLst>
+          </p:nvPr>
         </p:nvGraphicFramePr>
         <p:xfrm>
-          <a:off x="2072761" y="2125267"/>
+          <a:off x="2314061" y="4299926"/>
           <a:ext cx="892472" cy="1608715"/>
         </p:xfrm>
         <a:graphic>
@@ -11553,7 +11815,7 @@
         </p:nvSpPr>
         <p:spPr>
           <a:xfrm>
-            <a:off x="2072761" y="2125266"/>
+            <a:off x="2314061" y="4299925"/>
             <a:ext cx="892472" cy="1608716"/>
           </a:xfrm>
           <a:prstGeom prst="bracketPair">
@@ -11598,7 +11860,7 @@
         </p:nvSpPr>
         <p:spPr>
           <a:xfrm>
-            <a:off x="1695743" y="2676853"/>
+            <a:off x="1937043" y="4851512"/>
             <a:ext cx="404278" cy="415498"/>
           </a:xfrm>
           <a:prstGeom prst="rect">
@@ -11634,7 +11896,7 @@
         </p:nvSpPr>
         <p:spPr>
           <a:xfrm>
-            <a:off x="3048428" y="2733415"/>
+            <a:off x="3289728" y="4908074"/>
             <a:ext cx="325730" cy="300082"/>
           </a:xfrm>
           <a:prstGeom prst="rect">
@@ -11667,10 +11929,16 @@
           <p:cNvGraphicFramePr>
             <a:graphicFrameLocks/>
           </p:cNvGraphicFramePr>
-          <p:nvPr/>
+          <p:nvPr>
+            <p:extLst>
+              <p:ext uri="{D42A27DB-BD31-4B8C-83A1-F6EECF244321}">
+                <p14:modId xmlns:p14="http://schemas.microsoft.com/office/powerpoint/2010/main" val="3811233655"/>
+              </p:ext>
+            </p:extLst>
+          </p:nvPr>
         </p:nvGraphicFramePr>
         <p:xfrm>
-          <a:off x="3400770" y="2125266"/>
+          <a:off x="3642070" y="4299925"/>
           <a:ext cx="892472" cy="1608715"/>
         </p:xfrm>
         <a:graphic>
@@ -11838,7 +12106,7 @@
                     <a:p>
                       <a:pPr algn="ctr"/>
                       <a:r>
-                        <a:rPr lang="en-GB" sz="1400">
+                        <a:rPr lang="en-GB" sz="1400" dirty="0">
                           <a:solidFill>
                             <a:schemeClr val="accent6">
                               <a:lumMod val="75000"/>
@@ -12117,7 +12385,7 @@
                     <a:p>
                       <a:pPr algn="ctr"/>
                       <a:r>
-                        <a:rPr lang="en-GB" sz="1400">
+                        <a:rPr lang="en-GB" sz="1400" dirty="0">
                           <a:solidFill>
                             <a:srgbClr val="00B050"/>
                           </a:solidFill>
@@ -12176,7 +12444,7 @@
         </p:nvSpPr>
         <p:spPr>
           <a:xfrm>
-            <a:off x="3400770" y="2125265"/>
+            <a:off x="3642070" y="4299924"/>
             <a:ext cx="892472" cy="1608716"/>
           </a:xfrm>
           <a:prstGeom prst="bracketPair">
@@ -12228,14 +12496,110 @@
         </p:blipFill>
         <p:spPr>
           <a:xfrm>
-            <a:off x="4819223" y="2102229"/>
+            <a:off x="4819222" y="2826129"/>
             <a:ext cx="4210536" cy="3082513"/>
           </a:xfrm>
           <a:prstGeom prst="rect">
             <a:avLst/>
           </a:prstGeom>
+          <a:ln>
+            <a:solidFill>
+              <a:schemeClr val="accent1"/>
+            </a:solidFill>
+          </a:ln>
         </p:spPr>
       </p:pic>
+      <p:sp>
+        <p:nvSpPr>
+          <p:cNvPr id="6" name="TextBox 5">
+            <a:extLst>
+              <a:ext uri="{FF2B5EF4-FFF2-40B4-BE49-F238E27FC236}">
+                <a16:creationId xmlns:a16="http://schemas.microsoft.com/office/drawing/2014/main" id="{10CD987F-904A-D046-AD83-10A07ACB234E}"/>
+              </a:ext>
+            </a:extLst>
+          </p:cNvPr>
+          <p:cNvSpPr txBox="1"/>
+          <p:nvPr/>
+        </p:nvSpPr>
+        <p:spPr>
+          <a:xfrm>
+            <a:off x="4819223" y="2366231"/>
+            <a:ext cx="4210535" cy="369332"/>
+          </a:xfrm>
+          <a:prstGeom prst="rect">
+            <a:avLst/>
+          </a:prstGeom>
+          <a:noFill/>
+          <a:ln>
+            <a:solidFill>
+              <a:schemeClr val="accent1"/>
+            </a:solidFill>
+          </a:ln>
+        </p:spPr>
+        <p:txBody>
+          <a:bodyPr wrap="square" rtlCol="0">
+            <a:spAutoFit/>
+          </a:bodyPr>
+          <a:lstStyle/>
+          <a:p>
+            <a:r>
+              <a:rPr lang="en-US" dirty="0"/>
+              <a:t>In R</a:t>
+            </a:r>
+          </a:p>
+        </p:txBody>
+      </p:sp>
+      <p:sp>
+        <p:nvSpPr>
+          <p:cNvPr id="18" name="Content Placeholder 2">
+            <a:extLst>
+              <a:ext uri="{FF2B5EF4-FFF2-40B4-BE49-F238E27FC236}">
+                <a16:creationId xmlns:a16="http://schemas.microsoft.com/office/drawing/2014/main" id="{22CF83D7-E6E7-534D-BF77-10FFBB1572C6}"/>
+              </a:ext>
+            </a:extLst>
+          </p:cNvPr>
+          <p:cNvSpPr>
+            <a:spLocks noGrp="1"/>
+          </p:cNvSpPr>
+          <p:nvPr>
+            <p:ph idx="1"/>
+          </p:nvPr>
+        </p:nvSpPr>
+        <p:spPr>
+          <a:xfrm>
+            <a:off x="840431" y="1471525"/>
+            <a:ext cx="3780770" cy="2754611"/>
+          </a:xfrm>
+        </p:spPr>
+        <p:txBody>
+          <a:bodyPr/>
+          <a:lstStyle/>
+          <a:p>
+            <a:r>
+              <a:rPr lang="en-GB" dirty="0"/>
+              <a:t>Matrix addition and subtraction are </a:t>
+            </a:r>
+            <a:r>
+              <a:rPr lang="en-GB" b="1" i="1" dirty="0"/>
+              <a:t>element-wise</a:t>
+            </a:r>
+            <a:r>
+              <a:rPr lang="en-GB" i="1" dirty="0"/>
+              <a:t> </a:t>
+            </a:r>
+            <a:r>
+              <a:rPr lang="en-GB" dirty="0"/>
+              <a:t>operations.</a:t>
+            </a:r>
+          </a:p>
+          <a:p>
+            <a:r>
+              <a:rPr lang="en-GB" dirty="0"/>
+              <a:t>Only matrices with the same dimensions can be added/subtracted</a:t>
+            </a:r>
+          </a:p>
+        </p:txBody>
+      </p:sp>
     </p:spTree>
     <p:extLst>
       <p:ext uri="{BB962C8B-B14F-4D97-AF65-F5344CB8AC3E}">
@@ -13182,7 +13546,7 @@
           <a:noFill/>
           <a:ln w="25400" cap="flat" cmpd="sng">
             <a:solidFill>
-              <a:srgbClr val="004D99"/>
+              <a:schemeClr val="bg2"/>
             </a:solidFill>
             <a:prstDash val="solid"/>
             <a:round/>
@@ -13234,7 +13598,7 @@
           <a:noFill/>
           <a:ln w="25400" cap="flat" cmpd="sng">
             <a:solidFill>
-              <a:srgbClr val="004D99"/>
+              <a:schemeClr val="bg2"/>
             </a:solidFill>
             <a:prstDash val="solid"/>
             <a:round/>
@@ -13286,7 +13650,7 @@
           <a:noFill/>
           <a:ln w="25400" cap="flat" cmpd="sng">
             <a:solidFill>
-              <a:srgbClr val="004D99"/>
+              <a:schemeClr val="bg2"/>
             </a:solidFill>
             <a:prstDash val="solid"/>
             <a:round/>
@@ -14129,7 +14493,7 @@
           <a:noFill/>
           <a:ln w="25400" cap="flat" cmpd="sng">
             <a:solidFill>
-              <a:srgbClr val="004D99"/>
+              <a:schemeClr val="bg2"/>
             </a:solidFill>
             <a:prstDash val="solid"/>
             <a:round/>
@@ -14187,7 +14551,7 @@
           <a:noFill/>
           <a:ln w="25400" cap="flat" cmpd="sng">
             <a:solidFill>
-              <a:srgbClr val="004D99"/>
+              <a:schemeClr val="bg2"/>
             </a:solidFill>
             <a:prstDash val="solid"/>
             <a:round/>
@@ -14245,7 +14609,7 @@
           <a:noFill/>
           <a:ln w="25400" cap="flat" cmpd="sng">
             <a:solidFill>
-              <a:srgbClr val="004D99"/>
+              <a:schemeClr val="bg2"/>
             </a:solidFill>
             <a:prstDash val="solid"/>
             <a:round/>
@@ -15023,7 +15387,7 @@
           <a:noFill/>
           <a:ln w="25400" cap="flat" cmpd="sng">
             <a:solidFill>
-              <a:srgbClr val="004D99"/>
+              <a:schemeClr val="bg2"/>
             </a:solidFill>
             <a:prstDash val="solid"/>
             <a:round/>
@@ -15081,7 +15445,7 @@
           <a:noFill/>
           <a:ln w="25400" cap="flat" cmpd="sng">
             <a:solidFill>
-              <a:srgbClr val="004D99"/>
+              <a:schemeClr val="bg2"/>
             </a:solidFill>
             <a:prstDash val="solid"/>
             <a:round/>
@@ -15139,7 +15503,7 @@
           <a:noFill/>
           <a:ln w="25400" cap="flat" cmpd="sng">
             <a:solidFill>
-              <a:srgbClr val="004D99"/>
+              <a:schemeClr val="bg2"/>
             </a:solidFill>
             <a:prstDash val="solid"/>
             <a:round/>
@@ -15589,7 +15953,7 @@
           <a:noFill/>
           <a:ln>
             <a:solidFill>
-              <a:schemeClr val="bg2"/>
+              <a:srgbClr val="7030A0"/>
             </a:solidFill>
           </a:ln>
         </p:spPr>
@@ -15645,7 +16009,7 @@
           <a:noFill/>
           <a:ln>
             <a:solidFill>
-              <a:schemeClr val="bg2"/>
+              <a:srgbClr val="7030A0"/>
             </a:solidFill>
           </a:ln>
         </p:spPr>
@@ -15701,7 +16065,7 @@
           <a:noFill/>
           <a:ln>
             <a:solidFill>
-              <a:schemeClr val="bg2"/>
+              <a:srgbClr val="7030A0"/>
             </a:solidFill>
           </a:ln>
         </p:spPr>
@@ -15757,7 +16121,7 @@
           <a:noFill/>
           <a:ln>
             <a:solidFill>
-              <a:schemeClr val="bg2"/>
+              <a:schemeClr val="accent5"/>
             </a:solidFill>
           </a:ln>
         </p:spPr>
@@ -15813,7 +16177,7 @@
           <a:noFill/>
           <a:ln>
             <a:solidFill>
-              <a:schemeClr val="bg2"/>
+              <a:schemeClr val="accent5"/>
             </a:solidFill>
           </a:ln>
         </p:spPr>
@@ -15869,7 +16233,7 @@
           <a:noFill/>
           <a:ln>
             <a:solidFill>
-              <a:schemeClr val="bg2"/>
+              <a:schemeClr val="accent5"/>
             </a:solidFill>
           </a:ln>
         </p:spPr>
@@ -15925,7 +16289,7 @@
           <a:noFill/>
           <a:ln>
             <a:solidFill>
-              <a:schemeClr val="bg2"/>
+              <a:schemeClr val="accent6"/>
             </a:solidFill>
           </a:ln>
         </p:spPr>
@@ -15981,7 +16345,7 @@
           <a:noFill/>
           <a:ln>
             <a:solidFill>
-              <a:schemeClr val="bg2"/>
+              <a:schemeClr val="accent6"/>
             </a:solidFill>
           </a:ln>
         </p:spPr>
@@ -16037,7 +16401,7 @@
           <a:noFill/>
           <a:ln>
             <a:solidFill>
-              <a:schemeClr val="bg2"/>
+              <a:schemeClr val="accent6"/>
             </a:solidFill>
           </a:ln>
         </p:spPr>
@@ -17654,13 +18018,13 @@
             <p:ph idx="1"/>
             <p:extLst>
               <p:ext uri="{D42A27DB-BD31-4B8C-83A1-F6EECF244321}">
-                <p14:modId xmlns:p14="http://schemas.microsoft.com/office/powerpoint/2010/main" val="386108137"/>
+                <p14:modId xmlns:p14="http://schemas.microsoft.com/office/powerpoint/2010/main" val="2918926483"/>
               </p:ext>
             </p:extLst>
           </p:nvPr>
         </p:nvGraphicFramePr>
         <p:xfrm>
-          <a:off x="2683230" y="2799712"/>
+          <a:off x="2683230" y="2748912"/>
           <a:ext cx="1784944" cy="1286972"/>
         </p:xfrm>
         <a:graphic>
@@ -17833,7 +18197,7 @@
                     <a:p>
                       <a:pPr algn="ctr"/>
                       <a:r>
-                        <a:rPr lang="en-GB" sz="1400" b="0">
+                        <a:rPr lang="en-GB" sz="1400" b="0" dirty="0">
                           <a:solidFill>
                             <a:sysClr val="windowText" lastClr="000000"/>
                           </a:solidFill>
@@ -18417,7 +18781,7 @@
         </p:nvSpPr>
         <p:spPr>
           <a:xfrm>
-            <a:off x="2683228" y="2799712"/>
+            <a:off x="2683228" y="2748912"/>
             <a:ext cx="1784943" cy="1286973"/>
           </a:xfrm>
           <a:prstGeom prst="bracketPair">
@@ -18462,8 +18826,8 @@
         </p:nvSpPr>
         <p:spPr>
           <a:xfrm>
-            <a:off x="628650" y="2001522"/>
-            <a:ext cx="3702680" cy="369332"/>
+            <a:off x="946874" y="1814559"/>
+            <a:ext cx="7513558" cy="646331"/>
           </a:xfrm>
           <a:prstGeom prst="rect">
             <a:avLst/>
@@ -18471,16 +18835,25 @@
           <a:noFill/>
         </p:spPr>
         <p:txBody>
-          <a:bodyPr wrap="none" rtlCol="0">
+          <a:bodyPr wrap="square" rtlCol="0">
             <a:spAutoFit/>
           </a:bodyPr>
           <a:lstStyle/>
           <a:p>
             <a:r>
+              <a:rPr lang="en-GB" b="1" dirty="0"/>
+              <a:t>Multiple a matrix by a number</a:t>
+            </a:r>
+          </a:p>
+          <a:p>
+            <a:r>
               <a:rPr lang="en-GB" dirty="0"/>
-              <a:t>Multiple a matrix by a number</a:t>
-            </a:r>
-            <a:endParaRPr lang="en-GB" sz="1350" dirty="0"/>
+              <a:t>Each element in the matrix  multiplied with that number </a:t>
+            </a:r>
+            <a:r>
+              <a:rPr lang="en-GB" b="1" dirty="0"/>
+              <a:t> </a:t>
+            </a:r>
           </a:p>
         </p:txBody>
       </p:sp>
@@ -18498,8 +18871,8 @@
         </p:nvSpPr>
         <p:spPr>
           <a:xfrm>
-            <a:off x="2146158" y="3237860"/>
-            <a:ext cx="458780" cy="300082"/>
+            <a:off x="1899504" y="3087414"/>
+            <a:ext cx="671979" cy="461665"/>
           </a:xfrm>
           <a:prstGeom prst="rect">
             <a:avLst/>
@@ -18513,7 +18886,7 @@
           <a:lstStyle/>
           <a:p>
             <a:r>
-              <a:rPr lang="en-GB" sz="1350" dirty="0"/>
+              <a:rPr lang="en-GB" sz="2400" dirty="0"/>
               <a:t>2 x</a:t>
             </a:r>
           </a:p>
@@ -18534,13 +18907,13 @@
           <p:nvPr>
             <p:extLst>
               <p:ext uri="{D42A27DB-BD31-4B8C-83A1-F6EECF244321}">
-                <p14:modId xmlns:p14="http://schemas.microsoft.com/office/powerpoint/2010/main" val="192255080"/>
+                <p14:modId xmlns:p14="http://schemas.microsoft.com/office/powerpoint/2010/main" val="2143803212"/>
               </p:ext>
             </p:extLst>
           </p:nvPr>
         </p:nvGraphicFramePr>
         <p:xfrm>
-          <a:off x="5005243" y="2799712"/>
+          <a:off x="5005243" y="2748912"/>
           <a:ext cx="1784944" cy="1286972"/>
         </p:xfrm>
         <a:graphic>
@@ -19238,7 +19611,7 @@
                     <a:p>
                       <a:pPr algn="ctr"/>
                       <a:r>
-                        <a:rPr lang="en-GB" sz="1400">
+                        <a:rPr lang="en-GB" sz="1400" dirty="0">
                           <a:solidFill>
                             <a:sysClr val="windowText" lastClr="000000"/>
                           </a:solidFill>
@@ -19297,7 +19670,7 @@
         </p:nvSpPr>
         <p:spPr>
           <a:xfrm>
-            <a:off x="5005241" y="2799712"/>
+            <a:off x="5005241" y="2748912"/>
             <a:ext cx="1784943" cy="1286973"/>
           </a:xfrm>
           <a:prstGeom prst="bracketPair">
@@ -19342,7 +19715,7 @@
         </p:nvSpPr>
         <p:spPr>
           <a:xfrm>
-            <a:off x="4579919" y="3219006"/>
+            <a:off x="4579919" y="3168206"/>
             <a:ext cx="325730" cy="300082"/>
           </a:xfrm>
           <a:prstGeom prst="rect">
@@ -19379,7 +19752,7 @@
         </p:nvSpPr>
         <p:spPr bwMode="auto">
           <a:xfrm>
-            <a:off x="946875" y="4706426"/>
+            <a:off x="946875" y="4858826"/>
             <a:ext cx="3610838" cy="893862"/>
           </a:xfrm>
           <a:prstGeom prst="roundRect">
@@ -19390,7 +19763,7 @@
           </a:solidFill>
           <a:ln w="9525">
             <a:solidFill>
-              <a:schemeClr val="tx1"/>
+              <a:schemeClr val="accent1"/>
             </a:solidFill>
             <a:miter lim="800000"/>
             <a:headEnd/>
@@ -19766,7 +20139,7 @@
         </p:nvSpPr>
         <p:spPr>
           <a:xfrm>
-            <a:off x="4766436" y="5013527"/>
+            <a:off x="4766436" y="5165927"/>
             <a:ext cx="568472" cy="225867"/>
           </a:xfrm>
           <a:prstGeom prst="rightArrow">
@@ -19817,7 +20190,7 @@
         </p:nvSpPr>
         <p:spPr bwMode="auto">
           <a:xfrm>
-            <a:off x="5543630" y="4799238"/>
+            <a:off x="5543630" y="4951638"/>
             <a:ext cx="3280055" cy="715089"/>
           </a:xfrm>
           <a:prstGeom prst="roundRect">
@@ -19828,7 +20201,7 @@
           </a:solidFill>
           <a:ln w="9525">
             <a:solidFill>
-              <a:schemeClr val="tx1"/>
+              <a:schemeClr val="accent1"/>
             </a:solidFill>
             <a:miter lim="800000"/>
             <a:headEnd/>
@@ -20131,6 +20504,46 @@
                 <a:latin typeface="Lucida Console" panose="020B0609040504020204" pitchFamily="49" charset="0"/>
               </a:rPr>
               <a:t>20</a:t>
+            </a:r>
+          </a:p>
+        </p:txBody>
+      </p:sp>
+      <p:sp>
+        <p:nvSpPr>
+          <p:cNvPr id="13" name="TextBox 12">
+            <a:extLst>
+              <a:ext uri="{FF2B5EF4-FFF2-40B4-BE49-F238E27FC236}">
+                <a16:creationId xmlns:a16="http://schemas.microsoft.com/office/drawing/2014/main" id="{8605B395-2AC9-8E4B-A633-C978229B6BC1}"/>
+              </a:ext>
+            </a:extLst>
+          </p:cNvPr>
+          <p:cNvSpPr txBox="1"/>
+          <p:nvPr/>
+        </p:nvSpPr>
+        <p:spPr>
+          <a:xfrm>
+            <a:off x="946875" y="4425511"/>
+            <a:ext cx="4210535" cy="369332"/>
+          </a:xfrm>
+          <a:prstGeom prst="rect">
+            <a:avLst/>
+          </a:prstGeom>
+          <a:noFill/>
+          <a:ln>
+            <a:solidFill>
+              <a:schemeClr val="accent1"/>
+            </a:solidFill>
+          </a:ln>
+        </p:spPr>
+        <p:txBody>
+          <a:bodyPr wrap="square" rtlCol="0">
+            <a:spAutoFit/>
+          </a:bodyPr>
+          <a:lstStyle/>
+          <a:p>
+            <a:r>
+              <a:rPr lang="en-US" dirty="0"/>
+              <a:t>In R</a:t>
             </a:r>
           </a:p>
         </p:txBody>
@@ -21258,8 +21671,8 @@
         </p:nvSpPr>
         <p:spPr>
           <a:xfrm>
-            <a:off x="840432" y="274638"/>
-            <a:ext cx="8268072" cy="1143000"/>
+            <a:off x="618186" y="274638"/>
+            <a:ext cx="8490318" cy="1143000"/>
           </a:xfrm>
         </p:spPr>
         <p:txBody>
@@ -24806,7 +25219,7 @@
         <p:spPr>
           <a:xfrm>
             <a:off x="906391" y="1828686"/>
-            <a:ext cx="3558410" cy="369332"/>
+            <a:ext cx="3940502" cy="369332"/>
           </a:xfrm>
           <a:prstGeom prst="rect">
             <a:avLst/>
@@ -24820,10 +25233,10 @@
           <a:lstStyle/>
           <a:p>
             <a:r>
-              <a:rPr lang="en-GB" dirty="0"/>
+              <a:rPr lang="en-GB" b="1" dirty="0"/>
               <a:t>Multiple a matrix by a matrix</a:t>
             </a:r>
-            <a:endParaRPr lang="en-GB" sz="1350" dirty="0"/>
+            <a:endParaRPr lang="en-GB" sz="1350" b="1" dirty="0"/>
           </a:p>
         </p:txBody>
       </p:sp>
@@ -32116,8 +32529,8 @@
         </p:nvSpPr>
         <p:spPr bwMode="auto">
           <a:xfrm>
-            <a:off x="1077037" y="2565921"/>
-            <a:ext cx="2627156" cy="1787723"/>
+            <a:off x="840432" y="2759721"/>
+            <a:ext cx="3096568" cy="1430179"/>
           </a:xfrm>
           <a:prstGeom prst="roundRect">
             <a:avLst/>
@@ -32126,7 +32539,9 @@
             <a:srgbClr val="FFFFFF"/>
           </a:solidFill>
           <a:ln w="9525">
-            <a:noFill/>
+            <a:solidFill>
+              <a:schemeClr val="accent1"/>
+            </a:solidFill>
             <a:miter lim="800000"/>
             <a:headEnd/>
             <a:tailEnd/>
@@ -32732,7 +33147,7 @@
           <a:lstStyle/>
           <a:p>
             <a:r>
-              <a:rPr lang="en-GB"/>
+              <a:rPr lang="en-GB" dirty="0"/>
               <a:t>Matrix Multiplication in R</a:t>
             </a:r>
           </a:p>
@@ -32826,6 +33241,18 @@
           <a:prstGeom prst="rect">
             <a:avLst/>
           </a:prstGeom>
+          <a:solidFill>
+            <a:srgbClr val="FFFFFF"/>
+          </a:solidFill>
+          <a:ln w="9525">
+            <a:solidFill>
+              <a:schemeClr val="accent1"/>
+            </a:solidFill>
+            <a:miter lim="800000"/>
+            <a:headEnd/>
+            <a:tailEnd/>
+          </a:ln>
+          <a:effectLst/>
         </p:spPr>
       </p:pic>
       <p:sp>
@@ -32893,8 +33320,8 @@
         </p:nvSpPr>
         <p:spPr bwMode="auto">
           <a:xfrm>
-            <a:off x="5094789" y="3126340"/>
-            <a:ext cx="2627156" cy="715089"/>
+            <a:off x="5003800" y="3092057"/>
+            <a:ext cx="3009900" cy="730643"/>
           </a:xfrm>
           <a:prstGeom prst="roundRect">
             <a:avLst/>
@@ -32903,7 +33330,9 @@
             <a:srgbClr val="FFFFFF"/>
           </a:solidFill>
           <a:ln w="9525">
-            <a:noFill/>
+            <a:solidFill>
+              <a:schemeClr val="accent1"/>
+            </a:solidFill>
             <a:miter lim="800000"/>
             <a:headEnd/>
             <a:tailEnd/>
@@ -33248,196 +33677,128 @@
           </a:prstGeom>
         </p:spPr>
         <p:txBody>
-          <a:bodyPr vert="horz" lIns="68580" tIns="34290" rIns="68580" bIns="34290" rtlCol="0">
+          <a:bodyPr vert="horz" lIns="91440" tIns="45720" rIns="91440" bIns="45720" rtlCol="0">
             <a:normAutofit fontScale="92500"/>
           </a:bodyPr>
           <a:lstStyle>
-            <a:lvl1pPr marL="228600" indent="-228600" algn="l" defTabSz="914400" rtl="0" eaLnBrk="1" latinLnBrk="0" hangingPunct="1">
-              <a:lnSpc>
-                <a:spcPct val="90000"/>
-              </a:lnSpc>
+            <a:lvl1pPr marL="342900" indent="-228600">
               <a:spcBef>
-                <a:spcPts val="1000"/>
+                <a:spcPct val="20000"/>
               </a:spcBef>
-              <a:buFont typeface="Arial" panose="020B0604020202020204" pitchFamily="34" charset="0"/>
+              <a:buClr>
+                <a:schemeClr val="accent1"/>
+              </a:buClr>
+              <a:buSzPct val="100000"/>
+              <a:buFont typeface="Arial" pitchFamily="34" charset="0"/>
               <a:buChar char="•"/>
-              <a:defRPr sz="2800" kern="1200">
-                <a:solidFill>
-                  <a:schemeClr val="tx1"/>
-                </a:solidFill>
-                <a:latin typeface="+mn-lt"/>
-                <a:ea typeface="+mn-ea"/>
-                <a:cs typeface="+mn-cs"/>
-              </a:defRPr>
+              <a:defRPr sz="2200"/>
             </a:lvl1pPr>
-            <a:lvl2pPr marL="685800" indent="-228600" algn="l" defTabSz="914400" rtl="0" eaLnBrk="1" latinLnBrk="0" hangingPunct="1">
-              <a:lnSpc>
-                <a:spcPct val="90000"/>
-              </a:lnSpc>
+            <a:lvl2pPr marL="640080" indent="-228600">
               <a:spcBef>
-                <a:spcPts val="500"/>
+                <a:spcPct val="20000"/>
               </a:spcBef>
-              <a:buFont typeface="Arial" panose="020B0604020202020204" pitchFamily="34" charset="0"/>
+              <a:buClr>
+                <a:schemeClr val="accent2"/>
+              </a:buClr>
+              <a:buSzPct val="100000"/>
+              <a:buFont typeface="Arial" pitchFamily="34" charset="0"/>
               <a:buChar char="•"/>
-              <a:defRPr sz="2400" kern="1200">
-                <a:solidFill>
-                  <a:schemeClr val="tx1"/>
-                </a:solidFill>
-                <a:latin typeface="+mn-lt"/>
-                <a:ea typeface="+mn-ea"/>
-                <a:cs typeface="+mn-cs"/>
-              </a:defRPr>
+              <a:defRPr sz="2000"/>
             </a:lvl2pPr>
-            <a:lvl3pPr marL="1143000" indent="-228600" algn="l" defTabSz="914400" rtl="0" eaLnBrk="1" latinLnBrk="0" hangingPunct="1">
-              <a:lnSpc>
-                <a:spcPct val="90000"/>
-              </a:lnSpc>
+            <a:lvl3pPr marL="1005840" indent="-228600">
               <a:spcBef>
-                <a:spcPts val="500"/>
+                <a:spcPct val="20000"/>
               </a:spcBef>
-              <a:buFont typeface="Arial" panose="020B0604020202020204" pitchFamily="34" charset="0"/>
+              <a:buClr>
+                <a:schemeClr val="accent3"/>
+              </a:buClr>
+              <a:buSzPct val="100000"/>
+              <a:buFont typeface="Arial" pitchFamily="34" charset="0"/>
               <a:buChar char="•"/>
-              <a:defRPr sz="2000" kern="1200">
-                <a:solidFill>
-                  <a:schemeClr val="tx1"/>
-                </a:solidFill>
-                <a:latin typeface="+mn-lt"/>
-                <a:ea typeface="+mn-ea"/>
-                <a:cs typeface="+mn-cs"/>
-              </a:defRPr>
             </a:lvl3pPr>
-            <a:lvl4pPr marL="1600200" indent="-228600" algn="l" defTabSz="914400" rtl="0" eaLnBrk="1" latinLnBrk="0" hangingPunct="1">
-              <a:lnSpc>
-                <a:spcPct val="90000"/>
-              </a:lnSpc>
+            <a:lvl4pPr marL="1280160" indent="-228600">
               <a:spcBef>
-                <a:spcPts val="500"/>
+                <a:spcPct val="20000"/>
               </a:spcBef>
-              <a:buFont typeface="Arial" panose="020B0604020202020204" pitchFamily="34" charset="0"/>
+              <a:buClr>
+                <a:schemeClr val="accent4"/>
+              </a:buClr>
+              <a:buSzPct val="100000"/>
+              <a:buFont typeface="Arial" pitchFamily="34" charset="0"/>
               <a:buChar char="•"/>
-              <a:defRPr sz="1800" kern="1200">
-                <a:solidFill>
-                  <a:schemeClr val="tx1"/>
-                </a:solidFill>
-                <a:latin typeface="+mn-lt"/>
-                <a:ea typeface="+mn-ea"/>
-                <a:cs typeface="+mn-cs"/>
-              </a:defRPr>
+              <a:defRPr sz="1600"/>
             </a:lvl4pPr>
-            <a:lvl5pPr marL="2057400" indent="-228600" algn="l" defTabSz="914400" rtl="0" eaLnBrk="1" latinLnBrk="0" hangingPunct="1">
-              <a:lnSpc>
-                <a:spcPct val="90000"/>
-              </a:lnSpc>
+            <a:lvl5pPr marL="1554480" indent="-228600">
               <a:spcBef>
-                <a:spcPts val="500"/>
+                <a:spcPct val="20000"/>
               </a:spcBef>
-              <a:buFont typeface="Arial" panose="020B0604020202020204" pitchFamily="34" charset="0"/>
+              <a:buClr>
+                <a:schemeClr val="accent5"/>
+              </a:buClr>
+              <a:buSzPct val="100000"/>
+              <a:buFont typeface="Arial" pitchFamily="34" charset="0"/>
               <a:buChar char="•"/>
-              <a:defRPr sz="1800" kern="1200">
-                <a:solidFill>
-                  <a:schemeClr val="tx1"/>
-                </a:solidFill>
-                <a:latin typeface="+mn-lt"/>
-                <a:ea typeface="+mn-ea"/>
-                <a:cs typeface="+mn-cs"/>
-              </a:defRPr>
+              <a:defRPr sz="1400" baseline="0"/>
             </a:lvl5pPr>
-            <a:lvl6pPr marL="2514600" indent="-228600" algn="l" defTabSz="914400" rtl="0" eaLnBrk="1" latinLnBrk="0" hangingPunct="1">
-              <a:lnSpc>
-                <a:spcPct val="90000"/>
-              </a:lnSpc>
+            <a:lvl6pPr marL="1737360" indent="-182880">
               <a:spcBef>
-                <a:spcPts val="500"/>
+                <a:spcPct val="20000"/>
               </a:spcBef>
-              <a:buFont typeface="Arial" panose="020B0604020202020204" pitchFamily="34" charset="0"/>
+              <a:buClr>
+                <a:schemeClr val="accent1"/>
+              </a:buClr>
+              <a:buFont typeface="Arial" pitchFamily="34" charset="0"/>
               <a:buChar char="•"/>
-              <a:defRPr sz="1800" kern="1200">
-                <a:solidFill>
-                  <a:schemeClr val="tx1"/>
-                </a:solidFill>
-                <a:latin typeface="+mn-lt"/>
-                <a:ea typeface="+mn-ea"/>
-                <a:cs typeface="+mn-cs"/>
-              </a:defRPr>
+              <a:defRPr sz="1400" baseline="0"/>
             </a:lvl6pPr>
-            <a:lvl7pPr marL="2971800" indent="-228600" algn="l" defTabSz="914400" rtl="0" eaLnBrk="1" latinLnBrk="0" hangingPunct="1">
-              <a:lnSpc>
-                <a:spcPct val="90000"/>
-              </a:lnSpc>
+            <a:lvl7pPr marL="1920240" indent="-182880">
               <a:spcBef>
-                <a:spcPts val="500"/>
+                <a:spcPct val="20000"/>
               </a:spcBef>
-              <a:buFont typeface="Arial" panose="020B0604020202020204" pitchFamily="34" charset="0"/>
+              <a:buClr>
+                <a:schemeClr val="accent2"/>
+              </a:buClr>
+              <a:buFont typeface="Arial" pitchFamily="34" charset="0"/>
               <a:buChar char="•"/>
-              <a:defRPr sz="1800" kern="1200">
-                <a:solidFill>
-                  <a:schemeClr val="tx1"/>
-                </a:solidFill>
-                <a:latin typeface="+mn-lt"/>
-                <a:ea typeface="+mn-ea"/>
-                <a:cs typeface="+mn-cs"/>
-              </a:defRPr>
+              <a:defRPr sz="1400"/>
             </a:lvl7pPr>
-            <a:lvl8pPr marL="3429000" indent="-228600" algn="l" defTabSz="914400" rtl="0" eaLnBrk="1" latinLnBrk="0" hangingPunct="1">
-              <a:lnSpc>
-                <a:spcPct val="90000"/>
-              </a:lnSpc>
+            <a:lvl8pPr marL="2103120" indent="-182880">
               <a:spcBef>
-                <a:spcPts val="500"/>
+                <a:spcPct val="20000"/>
               </a:spcBef>
-              <a:buFont typeface="Arial" panose="020B0604020202020204" pitchFamily="34" charset="0"/>
+              <a:buClr>
+                <a:schemeClr val="accent3"/>
+              </a:buClr>
+              <a:buFont typeface="Arial" pitchFamily="34" charset="0"/>
               <a:buChar char="•"/>
-              <a:defRPr sz="1800" kern="1200">
-                <a:solidFill>
-                  <a:schemeClr val="tx1"/>
-                </a:solidFill>
-                <a:latin typeface="+mn-lt"/>
-                <a:ea typeface="+mn-ea"/>
-                <a:cs typeface="+mn-cs"/>
-              </a:defRPr>
+              <a:defRPr sz="1400"/>
             </a:lvl8pPr>
-            <a:lvl9pPr marL="3886200" indent="-228600" algn="l" defTabSz="914400" rtl="0" eaLnBrk="1" latinLnBrk="0" hangingPunct="1">
-              <a:lnSpc>
-                <a:spcPct val="90000"/>
-              </a:lnSpc>
+            <a:lvl9pPr marL="2286000" indent="-182880">
               <a:spcBef>
-                <a:spcPts val="500"/>
+                <a:spcPct val="20000"/>
               </a:spcBef>
-              <a:buFont typeface="Arial" panose="020B0604020202020204" pitchFamily="34" charset="0"/>
+              <a:buClr>
+                <a:schemeClr val="accent4"/>
+              </a:buClr>
+              <a:buFont typeface="Arial" pitchFamily="34" charset="0"/>
               <a:buChar char="•"/>
-              <a:defRPr sz="1800" kern="1200">
-                <a:solidFill>
-                  <a:schemeClr val="tx1"/>
-                </a:solidFill>
-                <a:latin typeface="+mn-lt"/>
-                <a:ea typeface="+mn-ea"/>
-                <a:cs typeface="+mn-cs"/>
-              </a:defRPr>
+              <a:defRPr sz="1400"/>
             </a:lvl9pPr>
           </a:lstStyle>
           <a:p>
             <a:r>
-              <a:rPr lang="en-GB" sz="2100" dirty="0"/>
+              <a:rPr lang="en-GB" dirty="0"/>
               <a:t>Matrix multiplication is achieved using the %*% operator </a:t>
             </a:r>
           </a:p>
           <a:p>
-            <a:pPr marL="0" indent="0">
-              <a:buNone/>
-            </a:pPr>
-            <a:endParaRPr lang="en-GB" sz="2100" dirty="0"/>
-          </a:p>
-          <a:p>
-            <a:pPr marL="0" indent="0">
-              <a:buNone/>
-            </a:pPr>
-            <a:endParaRPr lang="en-GB" sz="2100" dirty="0"/>
-          </a:p>
-          <a:p>
-            <a:pPr marL="0" indent="0">
-              <a:buNone/>
-            </a:pPr>
-            <a:endParaRPr lang="en-GB" sz="2100" dirty="0"/>
+            <a:endParaRPr lang="en-GB" dirty="0"/>
+          </a:p>
+          <a:p>
+            <a:endParaRPr lang="en-GB" dirty="0"/>
+          </a:p>
+          <a:p>
+            <a:endParaRPr lang="en-GB" dirty="0"/>
           </a:p>
         </p:txBody>
       </p:sp>

</xml_diff>

<commit_message>
Update matrix algebra slides
</commit_message>
<xml_diff>
--- a/static/Course_Modularization/Intro, general, packages/matrixAlgebraSlidesExtra.pptx
+++ b/static/Course_Modularization/Intro, general, packages/matrixAlgebraSlidesExtra.pptx
@@ -1303,10 +1303,6 @@
           <a:bodyPr/>
           <a:lstStyle/>
           <a:p>
-            <a:fld id="{DD3575FE-2CC2-2845-A91B-203C440E7198}" type="datetimeFigureOut">
-              <a:rPr lang="en-US" smtClean="0"/>
-              <a:t>12/1/21</a:t>
-            </a:fld>
             <a:endParaRPr lang="en-US"/>
           </a:p>
         </p:txBody>
@@ -1634,10 +1630,6 @@
           <a:bodyPr/>
           <a:lstStyle/>
           <a:p>
-            <a:fld id="{DD3575FE-2CC2-2845-A91B-203C440E7198}" type="datetimeFigureOut">
-              <a:rPr lang="en-US" smtClean="0"/>
-              <a:t>12/1/21</a:t>
-            </a:fld>
             <a:endParaRPr lang="en-US"/>
           </a:p>
         </p:txBody>
@@ -1818,10 +1810,6 @@
           <a:bodyPr/>
           <a:lstStyle/>
           <a:p>
-            <a:fld id="{DD3575FE-2CC2-2845-A91B-203C440E7198}" type="datetimeFigureOut">
-              <a:rPr lang="en-US" smtClean="0"/>
-              <a:t>12/1/21</a:t>
-            </a:fld>
             <a:endParaRPr lang="en-US"/>
           </a:p>
         </p:txBody>
@@ -2007,10 +1995,6 @@
           <a:bodyPr/>
           <a:lstStyle/>
           <a:p>
-            <a:fld id="{DD3575FE-2CC2-2845-A91B-203C440E7198}" type="datetimeFigureOut">
-              <a:rPr lang="en-US" smtClean="0"/>
-              <a:t>12/1/21</a:t>
-            </a:fld>
             <a:endParaRPr lang="en-US"/>
           </a:p>
         </p:txBody>
@@ -2159,10 +2143,6 @@
           <a:bodyPr/>
           <a:lstStyle/>
           <a:p>
-            <a:fld id="{DD3575FE-2CC2-2845-A91B-203C440E7198}" type="datetimeFigureOut">
-              <a:rPr lang="en-US" smtClean="0"/>
-              <a:t>12/1/21</a:t>
-            </a:fld>
             <a:endParaRPr lang="en-US"/>
           </a:p>
         </p:txBody>
@@ -3384,10 +3364,6 @@
           <a:bodyPr/>
           <a:lstStyle/>
           <a:p>
-            <a:fld id="{DD3575FE-2CC2-2845-A91B-203C440E7198}" type="datetimeFigureOut">
-              <a:rPr lang="en-US" smtClean="0"/>
-              <a:t>12/1/21</a:t>
-            </a:fld>
             <a:endParaRPr lang="en-US"/>
           </a:p>
         </p:txBody>
@@ -5815,10 +5791,6 @@
           <a:bodyPr/>
           <a:lstStyle/>
           <a:p>
-            <a:fld id="{DD3575FE-2CC2-2845-A91B-203C440E7198}" type="datetimeFigureOut">
-              <a:rPr lang="en-US" smtClean="0"/>
-              <a:t>12/1/21</a:t>
-            </a:fld>
             <a:endParaRPr lang="en-US"/>
           </a:p>
         </p:txBody>
@@ -6071,10 +6043,6 @@
           <a:bodyPr/>
           <a:lstStyle/>
           <a:p>
-            <a:fld id="{DD3575FE-2CC2-2845-A91B-203C440E7198}" type="datetimeFigureOut">
-              <a:rPr lang="en-US" smtClean="0"/>
-              <a:t>12/1/21</a:t>
-            </a:fld>
             <a:endParaRPr lang="en-US"/>
           </a:p>
         </p:txBody>
@@ -6372,10 +6340,6 @@
           <a:bodyPr/>
           <a:lstStyle/>
           <a:p>
-            <a:fld id="{DD3575FE-2CC2-2845-A91B-203C440E7198}" type="datetimeFigureOut">
-              <a:rPr lang="en-US" smtClean="0"/>
-              <a:t>12/1/21</a:t>
-            </a:fld>
             <a:endParaRPr lang="en-US"/>
           </a:p>
         </p:txBody>
@@ -6819,10 +6783,6 @@
           <a:bodyPr/>
           <a:lstStyle/>
           <a:p>
-            <a:fld id="{DD3575FE-2CC2-2845-A91B-203C440E7198}" type="datetimeFigureOut">
-              <a:rPr lang="en-US" smtClean="0"/>
-              <a:t>12/1/21</a:t>
-            </a:fld>
             <a:endParaRPr lang="en-US"/>
           </a:p>
         </p:txBody>
@@ -6952,10 +6912,6 @@
           <a:bodyPr/>
           <a:lstStyle/>
           <a:p>
-            <a:fld id="{DD3575FE-2CC2-2845-A91B-203C440E7198}" type="datetimeFigureOut">
-              <a:rPr lang="en-US" smtClean="0"/>
-              <a:t>12/1/21</a:t>
-            </a:fld>
             <a:endParaRPr lang="en-US"/>
           </a:p>
         </p:txBody>
@@ -7058,10 +7014,6 @@
           <a:bodyPr/>
           <a:lstStyle/>
           <a:p>
-            <a:fld id="{DD3575FE-2CC2-2845-A91B-203C440E7198}" type="datetimeFigureOut">
-              <a:rPr lang="en-US" smtClean="0"/>
-              <a:t>12/1/21</a:t>
-            </a:fld>
             <a:endParaRPr lang="en-US"/>
           </a:p>
         </p:txBody>
@@ -7407,10 +7359,6 @@
             </a:lvl1pPr>
           </a:lstStyle>
           <a:p>
-            <a:fld id="{DD3575FE-2CC2-2845-A91B-203C440E7198}" type="datetimeFigureOut">
-              <a:rPr lang="en-US" smtClean="0"/>
-              <a:t>12/1/21</a:t>
-            </a:fld>
             <a:endParaRPr lang="en-US"/>
           </a:p>
         </p:txBody>
@@ -7441,6 +7389,7 @@
     <p:sldLayoutId id="2147483708" r:id="rId15"/>
     <p:sldLayoutId id="2147483705" r:id="rId16"/>
   </p:sldLayoutIdLst>
+  <p:hf sldNum="0" hdr="0" ftr="0" dt="0"/>
   <p:txStyles>
     <p:titleStyle>
       <a:lvl1pPr algn="l" defTabSz="914400" rtl="0" eaLnBrk="1" latinLnBrk="0" hangingPunct="1">
@@ -9617,7 +9566,7 @@
           <a:p>
             <a:r>
               <a:rPr lang="en-US" sz="2800" b="1" dirty="0"/>
-              <a:t>Why matrix algebra a decision analysis? </a:t>
+              <a:t>Why matrix algebra in decision analysis? </a:t>
             </a:r>
           </a:p>
         </p:txBody>
@@ -10168,7 +10117,7 @@
               <a:rPr lang="en-US" sz="1400" dirty="0">
                 <a:latin typeface="Calibri" panose="020F0502020204030204" pitchFamily="34" charset="0"/>
               </a:rPr>
-              <a:t>Estimation of proportion in a specific health states also involves multiplication and summation.</a:t>
+              <a:t>Estimation of proportion in a specific health states also involves multiplication and addition.</a:t>
             </a:r>
           </a:p>
           <a:p>
@@ -10487,7 +10436,7 @@
           <a:p>
             <a:r>
               <a:rPr lang="en-US" sz="1400" dirty="0"/>
-              <a:t>Involves multiplication and summation</a:t>
+              <a:t>Involves multiplication and addition.</a:t>
             </a:r>
           </a:p>
         </p:txBody>
@@ -10724,7 +10673,7 @@
           <a:lstStyle/>
           <a:p>
             <a:r>
-              <a:rPr lang="en-GB" dirty="0"/>
+              <a:rPr lang="en-GB" sz="3600" dirty="0"/>
               <a:t>Matrix Addition and Subtraction</a:t>
             </a:r>
           </a:p>
@@ -12596,6 +12545,41 @@
             <a:r>
               <a:rPr lang="en-GB" dirty="0"/>
               <a:t>Only matrices with the same dimensions can be added/subtracted</a:t>
+            </a:r>
+          </a:p>
+        </p:txBody>
+      </p:sp>
+      <p:sp>
+        <p:nvSpPr>
+          <p:cNvPr id="19" name="TextBox 18">
+            <a:extLst>
+              <a:ext uri="{FF2B5EF4-FFF2-40B4-BE49-F238E27FC236}">
+                <a16:creationId xmlns:a16="http://schemas.microsoft.com/office/drawing/2014/main" id="{19F22A10-D51C-254A-9F30-F520344FD3D5}"/>
+              </a:ext>
+            </a:extLst>
+          </p:cNvPr>
+          <p:cNvSpPr txBox="1"/>
+          <p:nvPr/>
+        </p:nvSpPr>
+        <p:spPr>
+          <a:xfrm>
+            <a:off x="761387" y="6405912"/>
+            <a:ext cx="4173707" cy="369332"/>
+          </a:xfrm>
+          <a:prstGeom prst="rect">
+            <a:avLst/>
+          </a:prstGeom>
+          <a:noFill/>
+        </p:spPr>
+        <p:txBody>
+          <a:bodyPr wrap="none" rtlCol="0">
+            <a:spAutoFit/>
+          </a:bodyPr>
+          <a:lstStyle/>
+          <a:p>
+            <a:r>
+              <a:rPr lang="en-US" i="1" dirty="0"/>
+              <a:t>This works similar for subtractions</a:t>
             </a:r>
           </a:p>
         </p:txBody>
@@ -12735,6 +12719,51 @@
                       </p:childTnLst>
                     </p:cTn>
                   </p:par>
+                  <p:par>
+                    <p:cTn id="13" fill="hold">
+                      <p:stCondLst>
+                        <p:cond delay="indefinite"/>
+                      </p:stCondLst>
+                      <p:childTnLst>
+                        <p:par>
+                          <p:cTn id="14" fill="hold">
+                            <p:stCondLst>
+                              <p:cond delay="0"/>
+                            </p:stCondLst>
+                            <p:childTnLst>
+                              <p:par>
+                                <p:cTn id="15" presetID="1" presetClass="entr" presetSubtype="0" fill="hold" grpId="0" nodeType="clickEffect">
+                                  <p:stCondLst>
+                                    <p:cond delay="0"/>
+                                  </p:stCondLst>
+                                  <p:childTnLst>
+                                    <p:set>
+                                      <p:cBhvr>
+                                        <p:cTn id="16" dur="1" fill="hold">
+                                          <p:stCondLst>
+                                            <p:cond delay="0"/>
+                                          </p:stCondLst>
+                                        </p:cTn>
+                                        <p:tgtEl>
+                                          <p:spTgt spid="19"/>
+                                        </p:tgtEl>
+                                        <p:attrNameLst>
+                                          <p:attrName>style.visibility</p:attrName>
+                                        </p:attrNameLst>
+                                      </p:cBhvr>
+                                      <p:to>
+                                        <p:strVal val="visible"/>
+                                      </p:to>
+                                    </p:set>
+                                  </p:childTnLst>
+                                </p:cTn>
+                              </p:par>
+                            </p:childTnLst>
+                          </p:cTn>
+                        </p:par>
+                      </p:childTnLst>
+                    </p:cTn>
+                  </p:par>
                 </p:childTnLst>
               </p:cTn>
               <p:prevCondLst>
@@ -12758,6 +12787,7 @@
     </p:tnLst>
     <p:bldLst>
       <p:bldP spid="14" grpId="0" animBg="1"/>
+      <p:bldP spid="19" grpId="0"/>
     </p:bldLst>
   </p:timing>
 </p:sld>
@@ -12780,52 +12810,6 @@
           <a:chExt cx="0" cy="0"/>
         </a:xfrm>
       </p:grpSpPr>
-      <p:sp>
-        <p:nvSpPr>
-          <p:cNvPr id="796" name="Shape 796"/>
-          <p:cNvSpPr txBox="1">
-            <a:spLocks noGrp="1"/>
-          </p:cNvSpPr>
-          <p:nvPr>
-            <p:ph type="sldNum" sz="quarter" idx="12"/>
-          </p:nvPr>
-        </p:nvSpPr>
-        <p:spPr>
-          <a:prstGeom prst="rect">
-            <a:avLst/>
-          </a:prstGeom>
-          <a:noFill/>
-          <a:ln>
-            <a:noFill/>
-          </a:ln>
-        </p:spPr>
-        <p:txBody>
-          <a:bodyPr spcFirstLastPara="1" wrap="square" lIns="91425" tIns="45700" rIns="91425" bIns="45700" anchor="t" anchorCtr="0">
-            <a:noAutofit/>
-          </a:bodyPr>
-          <a:lstStyle/>
-          <a:p>
-            <a:pPr marL="0" lvl="0" indent="0" rtl="0">
-              <a:spcBef>
-                <a:spcPts val="0"/>
-              </a:spcBef>
-              <a:spcAft>
-                <a:spcPts val="0"/>
-              </a:spcAft>
-              <a:buClr>
-                <a:srgbClr val="000000"/>
-              </a:buClr>
-              <a:buFont typeface="Arial"/>
-              <a:buNone/>
-            </a:pPr>
-            <a:fld id="{00000000-1234-1234-1234-123412341234}" type="slidenum">
-              <a:rPr lang="nl-NL"/>
-              <a:t>4</a:t>
-            </a:fld>
-            <a:endParaRPr/>
-          </a:p>
-        </p:txBody>
-      </p:sp>
       <p:sp>
         <p:nvSpPr>
           <p:cNvPr id="770" name="Shape 770"/>
@@ -13682,39 +13666,6 @@
               <a:cs typeface="Arial"/>
               <a:sym typeface="Arial"/>
             </a:endParaRPr>
-          </a:p>
-        </p:txBody>
-      </p:sp>
-      <p:sp>
-        <p:nvSpPr>
-          <p:cNvPr id="46" name="Title 1">
-            <a:extLst>
-              <a:ext uri="{FF2B5EF4-FFF2-40B4-BE49-F238E27FC236}">
-                <a16:creationId xmlns:a16="http://schemas.microsoft.com/office/drawing/2014/main" id="{0F99415C-4C69-4482-8257-F65379CAA0A3}"/>
-              </a:ext>
-            </a:extLst>
-          </p:cNvPr>
-          <p:cNvSpPr>
-            <a:spLocks noGrp="1"/>
-          </p:cNvSpPr>
-          <p:nvPr>
-            <p:ph type="title"/>
-          </p:nvPr>
-        </p:nvSpPr>
-        <p:spPr>
-          <a:xfrm>
-            <a:off x="840432" y="274638"/>
-            <a:ext cx="7620000" cy="1143000"/>
-          </a:xfrm>
-        </p:spPr>
-        <p:txBody>
-          <a:bodyPr/>
-          <a:lstStyle/>
-          <a:p>
-            <a:r>
-              <a:rPr lang="en-US" dirty="0"/>
-              <a:t>Matrix Addition</a:t>
-            </a:r>
           </a:p>
         </p:txBody>
       </p:sp>
@@ -15657,7 +15608,7 @@
         </p:nvSpPr>
         <p:spPr>
           <a:xfrm>
-            <a:off x="779499" y="5866052"/>
+            <a:off x="757871" y="6363366"/>
             <a:ext cx="4173707" cy="369332"/>
           </a:xfrm>
           <a:prstGeom prst="rect">
@@ -15672,7 +15623,7 @@
           <a:lstStyle/>
           <a:p>
             <a:r>
-              <a:rPr lang="en-US" dirty="0"/>
+              <a:rPr lang="en-US" i="1" dirty="0"/>
               <a:t>This works similar for subtractions</a:t>
             </a:r>
           </a:p>
@@ -16431,6 +16382,39 @@
                 <a:schemeClr val="accent3"/>
               </a:solidFill>
             </a:endParaRPr>
+          </a:p>
+        </p:txBody>
+      </p:sp>
+      <p:sp>
+        <p:nvSpPr>
+          <p:cNvPr id="84" name="Title 1">
+            <a:extLst>
+              <a:ext uri="{FF2B5EF4-FFF2-40B4-BE49-F238E27FC236}">
+                <a16:creationId xmlns:a16="http://schemas.microsoft.com/office/drawing/2014/main" id="{01F129F5-1204-0547-9D6C-009E06895CB7}"/>
+              </a:ext>
+            </a:extLst>
+          </p:cNvPr>
+          <p:cNvSpPr>
+            <a:spLocks noGrp="1"/>
+          </p:cNvSpPr>
+          <p:nvPr>
+            <p:ph type="title"/>
+          </p:nvPr>
+        </p:nvSpPr>
+        <p:spPr>
+          <a:xfrm>
+            <a:off x="840431" y="274638"/>
+            <a:ext cx="8189327" cy="1143000"/>
+          </a:xfrm>
+        </p:spPr>
+        <p:txBody>
+          <a:bodyPr/>
+          <a:lstStyle/>
+          <a:p>
+            <a:r>
+              <a:rPr lang="en-GB" sz="3600" dirty="0"/>
+              <a:t>Matrix Addition and Subtraction (2)</a:t>
+            </a:r>
           </a:p>
         </p:txBody>
       </p:sp>
@@ -17996,7 +17980,7 @@
           <a:lstStyle/>
           <a:p>
             <a:r>
-              <a:rPr lang="en-GB"/>
+              <a:rPr lang="en-GB" dirty="0"/>
               <a:t>Matrix Multiplication</a:t>
             </a:r>
           </a:p>
@@ -20750,52 +20734,6 @@
       </p:grpSpPr>
       <p:sp>
         <p:nvSpPr>
-          <p:cNvPr id="796" name="Shape 796"/>
-          <p:cNvSpPr txBox="1">
-            <a:spLocks noGrp="1"/>
-          </p:cNvSpPr>
-          <p:nvPr>
-            <p:ph type="sldNum" sz="quarter" idx="12"/>
-          </p:nvPr>
-        </p:nvSpPr>
-        <p:spPr>
-          <a:prstGeom prst="rect">
-            <a:avLst/>
-          </a:prstGeom>
-          <a:noFill/>
-          <a:ln>
-            <a:noFill/>
-          </a:ln>
-        </p:spPr>
-        <p:txBody>
-          <a:bodyPr spcFirstLastPara="1" wrap="square" lIns="91425" tIns="45700" rIns="91425" bIns="45700" anchor="t" anchorCtr="0">
-            <a:noAutofit/>
-          </a:bodyPr>
-          <a:lstStyle/>
-          <a:p>
-            <a:pPr marL="0" lvl="0" indent="0" rtl="0">
-              <a:spcBef>
-                <a:spcPts val="0"/>
-              </a:spcBef>
-              <a:spcAft>
-                <a:spcPts val="0"/>
-              </a:spcAft>
-              <a:buClr>
-                <a:srgbClr val="000000"/>
-              </a:buClr>
-              <a:buFont typeface="Arial"/>
-              <a:buNone/>
-            </a:pPr>
-            <a:fld id="{00000000-1234-1234-1234-123412341234}" type="slidenum">
-              <a:rPr lang="nl-NL"/>
-              <a:t>6</a:t>
-            </a:fld>
-            <a:endParaRPr/>
-          </a:p>
-        </p:txBody>
-      </p:sp>
-      <p:sp>
-        <p:nvSpPr>
           <p:cNvPr id="770" name="Shape 770"/>
           <p:cNvSpPr txBox="1"/>
           <p:nvPr/>
@@ -21671,7 +21609,7 @@
         </p:nvSpPr>
         <p:spPr>
           <a:xfrm>
-            <a:off x="618186" y="274638"/>
+            <a:off x="653682" y="1268761"/>
             <a:ext cx="8490318" cy="1143000"/>
           </a:xfrm>
         </p:spPr>
@@ -21679,8 +21617,9 @@
           <a:bodyPr/>
           <a:lstStyle/>
           <a:p>
-            <a:r>
-              <a:rPr lang="en-US" dirty="0"/>
+            <a:pPr algn="ctr"/>
+            <a:r>
+              <a:rPr lang="en-US" sz="3200" dirty="0"/>
               <a:t>Matrix Element-wise Multiplication</a:t>
             </a:r>
           </a:p>
@@ -23601,7 +23540,7 @@
         </p:nvSpPr>
         <p:spPr>
           <a:xfrm>
-            <a:off x="885745" y="5907032"/>
+            <a:off x="699608" y="6313390"/>
             <a:ext cx="3831498" cy="369332"/>
           </a:xfrm>
           <a:prstGeom prst="rect">
@@ -23616,7 +23555,7 @@
           <a:lstStyle/>
           <a:p>
             <a:r>
-              <a:rPr lang="en-US" dirty="0"/>
+              <a:rPr lang="en-US" i="1" dirty="0"/>
               <a:t>This works similar for divisions</a:t>
             </a:r>
           </a:p>
@@ -23683,6 +23622,61 @@
               <a:latin typeface="Consolas" panose="020B0609020204030204" pitchFamily="49" charset="0"/>
               <a:cs typeface="Consolas" panose="020B0609020204030204" pitchFamily="49" charset="0"/>
             </a:endParaRPr>
+          </a:p>
+        </p:txBody>
+      </p:sp>
+      <p:sp>
+        <p:nvSpPr>
+          <p:cNvPr id="72" name="Title 1">
+            <a:extLst>
+              <a:ext uri="{FF2B5EF4-FFF2-40B4-BE49-F238E27FC236}">
+                <a16:creationId xmlns:a16="http://schemas.microsoft.com/office/drawing/2014/main" id="{46EF9A67-0576-8A4C-A8F7-A566B5884F19}"/>
+              </a:ext>
+            </a:extLst>
+          </p:cNvPr>
+          <p:cNvSpPr txBox="1">
+            <a:spLocks/>
+          </p:cNvSpPr>
+          <p:nvPr/>
+        </p:nvSpPr>
+        <p:spPr>
+          <a:xfrm>
+            <a:off x="840432" y="274638"/>
+            <a:ext cx="7620000" cy="1143000"/>
+          </a:xfrm>
+          <a:prstGeom prst="rect">
+            <a:avLst/>
+          </a:prstGeom>
+        </p:spPr>
+        <p:txBody>
+          <a:bodyPr vert="horz" lIns="91440" tIns="45720" rIns="91440" bIns="45720" rtlCol="0" anchor="ctr">
+            <a:noAutofit/>
+          </a:bodyPr>
+          <a:lstStyle>
+            <a:lvl1pPr algn="l" defTabSz="914400" rtl="0" eaLnBrk="1" latinLnBrk="0" hangingPunct="1">
+              <a:spcBef>
+                <a:spcPct val="0"/>
+              </a:spcBef>
+              <a:buNone/>
+              <a:defRPr sz="4000" kern="1200" cap="none" spc="-100" baseline="0">
+                <a:ln>
+                  <a:noFill/>
+                </a:ln>
+                <a:solidFill>
+                  <a:schemeClr val="tx1"/>
+                </a:solidFill>
+                <a:effectLst/>
+                <a:latin typeface="+mj-lt"/>
+                <a:ea typeface="+mj-ea"/>
+                <a:cs typeface="+mj-cs"/>
+              </a:defRPr>
+            </a:lvl1pPr>
+          </a:lstStyle>
+          <a:p>
+            <a:r>
+              <a:rPr lang="en-GB" dirty="0"/>
+              <a:t>Matrix Multiplication (2)</a:t>
+            </a:r>
           </a:p>
         </p:txBody>
       </p:sp>
@@ -24511,7 +24505,7 @@
           <a:p>
             <a:r>
               <a:rPr lang="en-GB" dirty="0"/>
-              <a:t>Matrix Multiplication</a:t>
+              <a:t>Matrix Multiplication (3)</a:t>
             </a:r>
           </a:p>
         </p:txBody>
@@ -25219,7 +25213,7 @@
         <p:spPr>
           <a:xfrm>
             <a:off x="906391" y="1828686"/>
-            <a:ext cx="3940502" cy="369332"/>
+            <a:ext cx="5194051" cy="461665"/>
           </a:xfrm>
           <a:prstGeom prst="rect">
             <a:avLst/>
@@ -25233,10 +25227,10 @@
           <a:lstStyle/>
           <a:p>
             <a:r>
-              <a:rPr lang="en-GB" b="1" dirty="0"/>
+              <a:rPr lang="en-GB" sz="2400" b="1" dirty="0"/>
               <a:t>Multiple a matrix by a matrix</a:t>
             </a:r>
-            <a:endParaRPr lang="en-GB" sz="1350" b="1" dirty="0"/>
+            <a:endParaRPr lang="en-GB" sz="1600" b="1" dirty="0"/>
           </a:p>
         </p:txBody>
       </p:sp>
@@ -28017,7 +28011,7 @@
 </file>
 
 <file path=ppt/slides/slide8.xml><?xml version="1.0" encoding="utf-8"?>
-<p:sld xmlns:a="http://schemas.openxmlformats.org/drawingml/2006/main" xmlns:r="http://schemas.openxmlformats.org/officeDocument/2006/relationships" xmlns:p="http://schemas.openxmlformats.org/presentationml/2006/main">
+<p:sld xmlns:a="http://schemas.openxmlformats.org/drawingml/2006/main" xmlns:r="http://schemas.openxmlformats.org/officeDocument/2006/relationships" xmlns:p="http://schemas.openxmlformats.org/presentationml/2006/main" show="0">
   <p:cSld>
     <p:spTree>
       <p:nvGrpSpPr>
@@ -28033,52 +28027,6 @@
           <a:chExt cx="0" cy="0"/>
         </a:xfrm>
       </p:grpSpPr>
-      <p:sp>
-        <p:nvSpPr>
-          <p:cNvPr id="796" name="Shape 796"/>
-          <p:cNvSpPr txBox="1">
-            <a:spLocks noGrp="1"/>
-          </p:cNvSpPr>
-          <p:nvPr>
-            <p:ph type="sldNum" sz="quarter" idx="12"/>
-          </p:nvPr>
-        </p:nvSpPr>
-        <p:spPr>
-          <a:prstGeom prst="rect">
-            <a:avLst/>
-          </a:prstGeom>
-          <a:noFill/>
-          <a:ln>
-            <a:noFill/>
-          </a:ln>
-        </p:spPr>
-        <p:txBody>
-          <a:bodyPr spcFirstLastPara="1" wrap="square" lIns="91425" tIns="45700" rIns="91425" bIns="45700" anchor="t" anchorCtr="0">
-            <a:noAutofit/>
-          </a:bodyPr>
-          <a:lstStyle/>
-          <a:p>
-            <a:pPr marL="0" lvl="0" indent="0" rtl="0">
-              <a:spcBef>
-                <a:spcPts val="0"/>
-              </a:spcBef>
-              <a:spcAft>
-                <a:spcPts val="0"/>
-              </a:spcAft>
-              <a:buClr>
-                <a:srgbClr val="000000"/>
-              </a:buClr>
-              <a:buFont typeface="Arial"/>
-              <a:buNone/>
-            </a:pPr>
-            <a:fld id="{00000000-1234-1234-1234-123412341234}" type="slidenum">
-              <a:rPr lang="nl-NL"/>
-              <a:t>8</a:t>
-            </a:fld>
-            <a:endParaRPr/>
-          </a:p>
-        </p:txBody>
-      </p:sp>
       <p:grpSp>
         <p:nvGrpSpPr>
           <p:cNvPr id="762" name="Shape 762"/>
@@ -29626,8 +29574,8 @@
           <a:lstStyle/>
           <a:p>
             <a:r>
-              <a:rPr lang="en-US"/>
-              <a:t>Matrix Multiplication </a:t>
+              <a:rPr lang="en-US" dirty="0"/>
+              <a:t>Matrix Multiplication (4) </a:t>
             </a:r>
           </a:p>
         </p:txBody>

</xml_diff>

<commit_message>
Make new figure for Markov tunnels
</commit_message>
<xml_diff>
--- a/static/Course_Modularization/Intro, general, packages/matrixAlgebraSlidesExtra.pptx
+++ b/static/Course_Modularization/Intro, general, packages/matrixAlgebraSlidesExtra.pptx
@@ -5,7 +5,7 @@
     <p:sldMasterId id="2147483690" r:id="rId1"/>
   </p:sldMasterIdLst>
   <p:notesMasterIdLst>
-    <p:notesMasterId r:id="rId13"/>
+    <p:notesMasterId r:id="rId12"/>
   </p:notesMasterIdLst>
   <p:sldIdLst>
     <p:sldId id="276" r:id="rId2"/>
@@ -18,7 +18,6 @@
     <p:sldId id="271" r:id="rId9"/>
     <p:sldId id="315" r:id="rId10"/>
     <p:sldId id="316" r:id="rId11"/>
-    <p:sldId id="277" r:id="rId12"/>
   </p:sldIdLst>
   <p:sldSz cx="9144000" cy="6858000" type="screen4x3"/>
   <p:notesSz cx="6858000" cy="9144000"/>
@@ -9274,8 +9273,8 @@
         </p:nvSpPr>
         <p:spPr>
           <a:xfrm>
-            <a:off x="5035064" y="3212743"/>
-            <a:ext cx="3776597" cy="369332"/>
+            <a:off x="5035065" y="3212743"/>
+            <a:ext cx="3308836" cy="369332"/>
           </a:xfrm>
           <a:prstGeom prst="rect">
             <a:avLst/>
@@ -9488,36 +9487,6 @@
       <p:bldP spid="9" grpId="0"/>
     </p:bldLst>
   </p:timing>
-</p:sld>
-</file>
-
-<file path=ppt/slides/slide11.xml><?xml version="1.0" encoding="utf-8"?>
-<p:sld xmlns:a="http://schemas.openxmlformats.org/drawingml/2006/main" xmlns:r="http://schemas.openxmlformats.org/officeDocument/2006/relationships" xmlns:p="http://schemas.openxmlformats.org/presentationml/2006/main">
-  <p:cSld>
-    <p:spTree>
-      <p:nvGrpSpPr>
-        <p:cNvPr id="1" name=""/>
-        <p:cNvGrpSpPr/>
-        <p:nvPr/>
-      </p:nvGrpSpPr>
-      <p:grpSpPr>
-        <a:xfrm>
-          <a:off x="0" y="0"/>
-          <a:ext cx="0" cy="0"/>
-          <a:chOff x="0" y="0"/>
-          <a:chExt cx="0" cy="0"/>
-        </a:xfrm>
-      </p:grpSpPr>
-    </p:spTree>
-    <p:extLst>
-      <p:ext uri="{BB962C8B-B14F-4D97-AF65-F5344CB8AC3E}">
-        <p14:creationId xmlns:p14="http://schemas.microsoft.com/office/powerpoint/2010/main" val="2550781434"/>
-      </p:ext>
-    </p:extLst>
-  </p:cSld>
-  <p:clrMapOvr>
-    <a:masterClrMapping/>
-  </p:clrMapOvr>
 </p:sld>
 </file>
 
@@ -10117,7 +10086,7 @@
               <a:rPr lang="en-US" sz="1400" dirty="0">
                 <a:latin typeface="Calibri" panose="020F0502020204030204" pitchFamily="34" charset="0"/>
               </a:rPr>
-              <a:t>Estimation of proportion in a specific health states also involves multiplication and addition.</a:t>
+              <a:t>Estimation of proportion of a cohort in a specific health states also involves multiplication and addition.</a:t>
             </a:r>
           </a:p>
           <a:p>
@@ -10295,66 +10264,6 @@
                 <a:latin typeface="Calibri" panose="020F0502020204030204" pitchFamily="34" charset="0"/>
               </a:rPr>
               <a:t>Dead</a:t>
-            </a:r>
-            <a:r>
-              <a:rPr lang="en-US" sz="1400" dirty="0">
-                <a:latin typeface="Calibri" panose="020F0502020204030204" pitchFamily="34" charset="0"/>
-              </a:rPr>
-              <a:t>) – </a:t>
-            </a:r>
-            <a:r>
-              <a:rPr lang="en-US" sz="1400" i="1" dirty="0">
-                <a:latin typeface="Calibri" panose="020F0502020204030204" pitchFamily="34" charset="0"/>
-              </a:rPr>
-              <a:t>(</a:t>
-            </a:r>
-            <a:r>
-              <a:rPr lang="en-US" sz="1400" i="1" dirty="0" err="1">
-                <a:latin typeface="Calibri" panose="020F0502020204030204" pitchFamily="34" charset="0"/>
-              </a:rPr>
-              <a:t>p</a:t>
-            </a:r>
-            <a:r>
-              <a:rPr lang="en-US" sz="1400" i="1" baseline="-25000" dirty="0" err="1">
-                <a:latin typeface="Calibri" panose="020F0502020204030204" pitchFamily="34" charset="0"/>
-              </a:rPr>
-              <a:t>sick</a:t>
-            </a:r>
-            <a:r>
-              <a:rPr lang="en-US" sz="1400" i="1" baseline="-25000" dirty="0">
-                <a:latin typeface="Calibri" panose="020F0502020204030204" pitchFamily="34" charset="0"/>
-              </a:rPr>
-              <a:t>, dead</a:t>
-            </a:r>
-            <a:r>
-              <a:rPr lang="en-US" sz="1400" i="1" dirty="0">
-                <a:latin typeface="Calibri" panose="020F0502020204030204" pitchFamily="34" charset="0"/>
-              </a:rPr>
-              <a:t> </a:t>
-            </a:r>
-            <a:r>
-              <a:rPr lang="en-US" sz="1400" dirty="0">
-                <a:latin typeface="Calibri" panose="020F0502020204030204" pitchFamily="34" charset="0"/>
-              </a:rPr>
-              <a:t>)*</a:t>
-            </a:r>
-            <a:r>
-              <a:rPr lang="en-US" sz="1400" dirty="0" err="1">
-                <a:latin typeface="Calibri" panose="020F0502020204030204" pitchFamily="34" charset="0"/>
-              </a:rPr>
-              <a:t>Pr</a:t>
-            </a:r>
-            <a:r>
-              <a:rPr lang="en-US" sz="1400" dirty="0">
-                <a:latin typeface="Calibri" panose="020F0502020204030204" pitchFamily="34" charset="0"/>
-              </a:rPr>
-              <a:t>(</a:t>
-            </a:r>
-            <a:r>
-              <a:rPr lang="en-US" sz="1400" i="1" dirty="0">
-                <a:latin typeface="Calibri" panose="020F0502020204030204" pitchFamily="34" charset="0"/>
-              </a:rPr>
-              <a:t>Sick</a:t>
             </a:r>
             <a:r>
               <a:rPr lang="en-US" sz="1400" dirty="0">
@@ -33131,7 +33040,19 @@
           <a:p>
             <a:r>
               <a:rPr lang="en-GB" dirty="0"/>
-              <a:t>The standard multiplication operator in R * gives </a:t>
+              <a:t>The standard multiplication operator in R </a:t>
+            </a:r>
+            <a:r>
+              <a:rPr lang="en-GB" dirty="0">
+                <a:solidFill>
+                  <a:schemeClr val="accent5"/>
+                </a:solidFill>
+              </a:rPr>
+              <a:t>*</a:t>
+            </a:r>
+            <a:r>
+              <a:rPr lang="en-GB" dirty="0"/>
+              <a:t> gives </a:t>
             </a:r>
             <a:r>
               <a:rPr lang="en-GB" i="1" dirty="0"/>
@@ -33736,7 +33657,19 @@
           <a:p>
             <a:r>
               <a:rPr lang="en-GB" dirty="0"/>
-              <a:t>Matrix multiplication is achieved using the %*% operator </a:t>
+              <a:t>Matrix multiplication is achieved using the </a:t>
+            </a:r>
+            <a:r>
+              <a:rPr lang="en-GB" dirty="0">
+                <a:solidFill>
+                  <a:schemeClr val="accent5"/>
+                </a:solidFill>
+              </a:rPr>
+              <a:t>%*%</a:t>
+            </a:r>
+            <a:r>
+              <a:rPr lang="en-GB" dirty="0"/>
+              <a:t> operator </a:t>
             </a:r>
           </a:p>
           <a:p>

</xml_diff>